<commit_message>
Index, hint, and slides updates
Adding a few indexes to tables used in the examples to improve behavior. Slight rewording in the slide deck.
</commit_message>
<xml_diff>
--- a/One Bite at a Time.pptx
+++ b/One Bite at a Time.pptx
@@ -206,10 +206,17 @@
   <pc:docChgLst>
     <pc:chgData name="Jared Poche" userId="1e6e382f47668c82" providerId="LiveId" clId="{BB6F1FFB-C1D6-442F-AED1-DB34F2FA3E3D}"/>
     <pc:docChg chg="custSel addSld modSld">
-      <pc:chgData name="Jared Poche" userId="1e6e382f47668c82" providerId="LiveId" clId="{BB6F1FFB-C1D6-442F-AED1-DB34F2FA3E3D}" dt="2022-02-10T01:49:47.654" v="157" actId="313"/>
+      <pc:chgData name="Jared Poche" userId="1e6e382f47668c82" providerId="LiveId" clId="{BB6F1FFB-C1D6-442F-AED1-DB34F2FA3E3D}" dt="2022-05-09T19:38:10.350" v="180" actId="33524"/>
       <pc:docMkLst>
         <pc:docMk/>
       </pc:docMkLst>
+      <pc:sldChg chg="modNotesTx">
+        <pc:chgData name="Jared Poche" userId="1e6e382f47668c82" providerId="LiveId" clId="{BB6F1FFB-C1D6-442F-AED1-DB34F2FA3E3D}" dt="2022-05-09T19:28:01.027" v="179" actId="20577"/>
+        <pc:sldMkLst>
+          <pc:docMk/>
+          <pc:sldMk cId="480440924" sldId="259"/>
+        </pc:sldMkLst>
+      </pc:sldChg>
       <pc:sldChg chg="modSp mod">
         <pc:chgData name="Jared Poche" userId="1e6e382f47668c82" providerId="LiveId" clId="{BB6F1FFB-C1D6-442F-AED1-DB34F2FA3E3D}" dt="2022-02-10T01:49:47.654" v="157" actId="313"/>
         <pc:sldMkLst>
@@ -226,7 +233,7 @@
         </pc:spChg>
       </pc:sldChg>
       <pc:sldChg chg="modSp add mod">
-        <pc:chgData name="Jared Poche" userId="1e6e382f47668c82" providerId="LiveId" clId="{BB6F1FFB-C1D6-442F-AED1-DB34F2FA3E3D}" dt="2022-02-10T00:26:41.959" v="153" actId="20577"/>
+        <pc:chgData name="Jared Poche" userId="1e6e382f47668c82" providerId="LiveId" clId="{BB6F1FFB-C1D6-442F-AED1-DB34F2FA3E3D}" dt="2022-05-09T19:38:10.350" v="180" actId="33524"/>
         <pc:sldMkLst>
           <pc:docMk/>
           <pc:sldMk cId="3686424161" sldId="268"/>
@@ -240,7 +247,7 @@
           </ac:spMkLst>
         </pc:spChg>
         <pc:spChg chg="mod">
-          <ac:chgData name="Jared Poche" userId="1e6e382f47668c82" providerId="LiveId" clId="{BB6F1FFB-C1D6-442F-AED1-DB34F2FA3E3D}" dt="2022-02-10T00:26:41.959" v="153" actId="20577"/>
+          <ac:chgData name="Jared Poche" userId="1e6e382f47668c82" providerId="LiveId" clId="{BB6F1FFB-C1D6-442F-AED1-DB34F2FA3E3D}" dt="2022-05-09T19:38:10.350" v="180" actId="33524"/>
           <ac:spMkLst>
             <pc:docMk/>
             <pc:sldMk cId="3686424161" sldId="268"/>
@@ -731,7 +738,7 @@
           <a:p>
             <a:fld id="{D70D1238-12F6-465A-AE3E-A7ECE5AEA9AC}" type="datetimeFigureOut">
               <a:rPr lang="en-US" smtClean="0"/>
-              <a:t>2/9/2022</a:t>
+              <a:t>5/9/2022</a:t>
             </a:fld>
             <a:endParaRPr lang="en-US"/>
           </a:p>
@@ -1128,7 +1135,7 @@
           <a:p>
             <a:r>
               <a:rPr lang="en-US" dirty="0"/>
-              <a:t>Examples 11-13</a:t>
+              <a:t>Ex 11 - 13</a:t>
             </a:r>
           </a:p>
         </p:txBody>
@@ -1150,7 +1157,7 @@
           <a:p>
             <a:fld id="{8FC505C0-83C5-44F4-A47D-3D983EF0E92D}" type="slidenum">
               <a:rPr lang="en-US" smtClean="0"/>
-              <a:t>7</a:t>
+              <a:t>4</a:t>
             </a:fld>
             <a:endParaRPr lang="en-US"/>
           </a:p>
@@ -1159,7 +1166,7 @@
     </p:spTree>
     <p:extLst>
       <p:ext uri="{BB962C8B-B14F-4D97-AF65-F5344CB8AC3E}">
-        <p14:creationId xmlns:p14="http://schemas.microsoft.com/office/powerpoint/2010/main" val="4187889473"/>
+        <p14:creationId xmlns:p14="http://schemas.microsoft.com/office/powerpoint/2010/main" val="2058295168"/>
       </p:ext>
     </p:extLst>
   </p:cSld>
@@ -1213,7 +1220,10 @@
           <a:bodyPr/>
           <a:lstStyle/>
           <a:p>
-            <a:endParaRPr lang="en-US" dirty="0"/>
+            <a:r>
+              <a:rPr lang="en-US" dirty="0"/>
+              <a:t>Examples 11-13</a:t>
+            </a:r>
           </a:p>
         </p:txBody>
       </p:sp>
@@ -1234,7 +1244,7 @@
           <a:p>
             <a:fld id="{8FC505C0-83C5-44F4-A47D-3D983EF0E92D}" type="slidenum">
               <a:rPr lang="en-US" smtClean="0"/>
-              <a:t>8</a:t>
+              <a:t>7</a:t>
             </a:fld>
             <a:endParaRPr lang="en-US"/>
           </a:p>
@@ -1243,7 +1253,7 @@
     </p:spTree>
     <p:extLst>
       <p:ext uri="{BB962C8B-B14F-4D97-AF65-F5344CB8AC3E}">
-        <p14:creationId xmlns:p14="http://schemas.microsoft.com/office/powerpoint/2010/main" val="147286913"/>
+        <p14:creationId xmlns:p14="http://schemas.microsoft.com/office/powerpoint/2010/main" val="4187889473"/>
       </p:ext>
     </p:extLst>
   </p:cSld>
@@ -1297,6 +1307,90 @@
           <a:bodyPr/>
           <a:lstStyle/>
           <a:p>
+            <a:endParaRPr lang="en-US" dirty="0"/>
+          </a:p>
+        </p:txBody>
+      </p:sp>
+      <p:sp>
+        <p:nvSpPr>
+          <p:cNvPr id="4" name="Slide Number Placeholder 3"/>
+          <p:cNvSpPr>
+            <a:spLocks noGrp="1"/>
+          </p:cNvSpPr>
+          <p:nvPr>
+            <p:ph type="sldNum" sz="quarter" idx="5"/>
+          </p:nvPr>
+        </p:nvSpPr>
+        <p:spPr/>
+        <p:txBody>
+          <a:bodyPr/>
+          <a:lstStyle/>
+          <a:p>
+            <a:fld id="{8FC505C0-83C5-44F4-A47D-3D983EF0E92D}" type="slidenum">
+              <a:rPr lang="en-US" smtClean="0"/>
+              <a:t>8</a:t>
+            </a:fld>
+            <a:endParaRPr lang="en-US"/>
+          </a:p>
+        </p:txBody>
+      </p:sp>
+    </p:spTree>
+    <p:extLst>
+      <p:ext uri="{BB962C8B-B14F-4D97-AF65-F5344CB8AC3E}">
+        <p14:creationId xmlns:p14="http://schemas.microsoft.com/office/powerpoint/2010/main" val="147286913"/>
+      </p:ext>
+    </p:extLst>
+  </p:cSld>
+  <p:clrMapOvr>
+    <a:masterClrMapping/>
+  </p:clrMapOvr>
+</p:notes>
+</file>
+
+<file path=ppt/notesSlides/notesSlide5.xml><?xml version="1.0" encoding="utf-8"?>
+<p:notes xmlns:a="http://schemas.openxmlformats.org/drawingml/2006/main" xmlns:r="http://schemas.openxmlformats.org/officeDocument/2006/relationships" xmlns:p="http://schemas.openxmlformats.org/presentationml/2006/main">
+  <p:cSld>
+    <p:spTree>
+      <p:nvGrpSpPr>
+        <p:cNvPr id="1" name=""/>
+        <p:cNvGrpSpPr/>
+        <p:nvPr/>
+      </p:nvGrpSpPr>
+      <p:grpSpPr>
+        <a:xfrm>
+          <a:off x="0" y="0"/>
+          <a:ext cx="0" cy="0"/>
+          <a:chOff x="0" y="0"/>
+          <a:chExt cx="0" cy="0"/>
+        </a:xfrm>
+      </p:grpSpPr>
+      <p:sp>
+        <p:nvSpPr>
+          <p:cNvPr id="2" name="Slide Image Placeholder 1"/>
+          <p:cNvSpPr>
+            <a:spLocks noGrp="1" noRot="1" noChangeAspect="1"/>
+          </p:cNvSpPr>
+          <p:nvPr>
+            <p:ph type="sldImg"/>
+          </p:nvPr>
+        </p:nvSpPr>
+        <p:spPr/>
+      </p:sp>
+      <p:sp>
+        <p:nvSpPr>
+          <p:cNvPr id="3" name="Notes Placeholder 2"/>
+          <p:cNvSpPr>
+            <a:spLocks noGrp="1"/>
+          </p:cNvSpPr>
+          <p:nvPr>
+            <p:ph type="body" idx="1"/>
+          </p:nvPr>
+        </p:nvSpPr>
+        <p:spPr/>
+        <p:txBody>
+          <a:bodyPr/>
+          <a:lstStyle/>
+          <a:p>
             <a:pPr marL="0" marR="0" lvl="0" indent="0" algn="l" defTabSz="914400" rtl="0" eaLnBrk="1" fontAlgn="auto" latinLnBrk="0" hangingPunct="1">
               <a:lnSpc>
                 <a:spcPct val="100000"/>
@@ -1357,7 +1451,7 @@
 </p:notes>
 </file>
 
-<file path=ppt/notesSlides/notesSlide5.xml><?xml version="1.0" encoding="utf-8"?>
+<file path=ppt/notesSlides/notesSlide6.xml><?xml version="1.0" encoding="utf-8"?>
 <p:notes xmlns:a="http://schemas.openxmlformats.org/drawingml/2006/main" xmlns:r="http://schemas.openxmlformats.org/officeDocument/2006/relationships" xmlns:p="http://schemas.openxmlformats.org/presentationml/2006/main">
   <p:cSld>
     <p:spTree>
@@ -1580,7 +1674,7 @@
           <a:p>
             <a:fld id="{48A87A34-81AB-432B-8DAE-1953F412C126}" type="datetimeFigureOut">
               <a:rPr lang="en-US" smtClean="0"/>
-              <a:t>2/9/2022</a:t>
+              <a:t>5/9/2022</a:t>
             </a:fld>
             <a:endParaRPr lang="en-US" dirty="0"/>
           </a:p>
@@ -1760,7 +1854,7 @@
           <a:p>
             <a:fld id="{48A87A34-81AB-432B-8DAE-1953F412C126}" type="datetimeFigureOut">
               <a:rPr lang="en-US" smtClean="0"/>
-              <a:t>2/9/2022</a:t>
+              <a:t>5/9/2022</a:t>
             </a:fld>
             <a:endParaRPr lang="en-US" dirty="0"/>
           </a:p>
@@ -1944,7 +2038,7 @@
           <a:p>
             <a:fld id="{48A87A34-81AB-432B-8DAE-1953F412C126}" type="datetimeFigureOut">
               <a:rPr lang="en-US" smtClean="0"/>
-              <a:t>2/9/2022</a:t>
+              <a:t>5/9/2022</a:t>
             </a:fld>
             <a:endParaRPr lang="en-US" dirty="0"/>
           </a:p>
@@ -2114,7 +2208,7 @@
           <a:p>
             <a:fld id="{48A87A34-81AB-432B-8DAE-1953F412C126}" type="datetimeFigureOut">
               <a:rPr lang="en-US" smtClean="0"/>
-              <a:t>2/9/2022</a:t>
+              <a:t>5/9/2022</a:t>
             </a:fld>
             <a:endParaRPr lang="en-US" dirty="0"/>
           </a:p>
@@ -2362,7 +2456,7 @@
           <a:p>
             <a:fld id="{48A87A34-81AB-432B-8DAE-1953F412C126}" type="datetimeFigureOut">
               <a:rPr lang="en-US" smtClean="0"/>
-              <a:t>2/9/2022</a:t>
+              <a:t>5/9/2022</a:t>
             </a:fld>
             <a:endParaRPr lang="en-US" dirty="0"/>
           </a:p>
@@ -2599,7 +2693,7 @@
           <a:p>
             <a:fld id="{48A87A34-81AB-432B-8DAE-1953F412C126}" type="datetimeFigureOut">
               <a:rPr lang="en-US" smtClean="0"/>
-              <a:t>2/9/2022</a:t>
+              <a:t>5/9/2022</a:t>
             </a:fld>
             <a:endParaRPr lang="en-US" dirty="0"/>
           </a:p>
@@ -2984,7 +3078,7 @@
           <a:p>
             <a:fld id="{48A87A34-81AB-432B-8DAE-1953F412C126}" type="datetimeFigureOut">
               <a:rPr lang="en-US" smtClean="0"/>
-              <a:t>2/9/2022</a:t>
+              <a:t>5/9/2022</a:t>
             </a:fld>
             <a:endParaRPr lang="en-US" dirty="0"/>
           </a:p>
@@ -3102,7 +3196,7 @@
           <a:p>
             <a:fld id="{48A87A34-81AB-432B-8DAE-1953F412C126}" type="datetimeFigureOut">
               <a:rPr lang="en-US" smtClean="0"/>
-              <a:t>2/9/2022</a:t>
+              <a:t>5/9/2022</a:t>
             </a:fld>
             <a:endParaRPr lang="en-US" dirty="0"/>
           </a:p>
@@ -3197,7 +3291,7 @@
           <a:p>
             <a:fld id="{48A87A34-81AB-432B-8DAE-1953F412C126}" type="datetimeFigureOut">
               <a:rPr lang="en-US" smtClean="0"/>
-              <a:t>2/9/2022</a:t>
+              <a:t>5/9/2022</a:t>
             </a:fld>
             <a:endParaRPr lang="en-US" dirty="0"/>
           </a:p>
@@ -3448,7 +3542,7 @@
           <a:p>
             <a:fld id="{48A87A34-81AB-432B-8DAE-1953F412C126}" type="datetimeFigureOut">
               <a:rPr lang="en-US" smtClean="0"/>
-              <a:t>2/9/2022</a:t>
+              <a:t>5/9/2022</a:t>
             </a:fld>
             <a:endParaRPr lang="en-US" dirty="0"/>
           </a:p>
@@ -3840,7 +3934,7 @@
             <a:fld id="{48A87A34-81AB-432B-8DAE-1953F412C126}" type="datetimeFigureOut">
               <a:rPr lang="en-US" smtClean="0"/>
               <a:pPr/>
-              <a:t>2/9/2022</a:t>
+              <a:t>5/9/2022</a:t>
             </a:fld>
             <a:endParaRPr lang="en-US" dirty="0"/>
           </a:p>
@@ -4059,7 +4153,7 @@
             <a:fld id="{48A87A34-81AB-432B-8DAE-1953F412C126}" type="datetimeFigureOut">
               <a:rPr lang="en-US" smtClean="0"/>
               <a:pPr/>
-              <a:t>2/9/2022</a:t>
+              <a:t>5/9/2022</a:t>
             </a:fld>
             <a:endParaRPr lang="en-US" dirty="0"/>
           </a:p>
@@ -5747,7 +5841,7 @@
           <p:nvPr/>
         </p:nvPicPr>
         <p:blipFill>
-          <a:blip r:embed="rId2"/>
+          <a:blip r:embed="rId3"/>
           <a:stretch>
             <a:fillRect/>
           </a:stretch>
@@ -6083,7 +6177,7 @@
           <a:p>
             <a:r>
               <a:rPr lang="en-US" dirty="0"/>
-              <a:t>But we have to choose one</a:t>
+              <a:t>But we must choose one</a:t>
             </a:r>
           </a:p>
         </p:txBody>

</xml_diff>

<commit_message>
OneBite: Updates to examples and slides
</commit_message>
<xml_diff>
--- a/One Bite at a Time.pptx
+++ b/One Bite at a Time.pptx
@@ -9,10 +9,10 @@
   </p:notesMasterIdLst>
   <p:sldIdLst>
     <p:sldId id="256" r:id="rId2"/>
-    <p:sldId id="266" r:id="rId3"/>
-    <p:sldId id="257" r:id="rId4"/>
-    <p:sldId id="259" r:id="rId5"/>
-    <p:sldId id="258" r:id="rId6"/>
+    <p:sldId id="306" r:id="rId3"/>
+    <p:sldId id="269" r:id="rId4"/>
+    <p:sldId id="257" r:id="rId5"/>
+    <p:sldId id="259" r:id="rId6"/>
     <p:sldId id="268" r:id="rId7"/>
     <p:sldId id="260" r:id="rId8"/>
     <p:sldId id="262" r:id="rId9"/>
@@ -141,6 +141,14 @@
 </p:presentation>
 </file>
 
+<file path=ppt/revisionInfo.xml><?xml version="1.0" encoding="utf-8"?>
+<p1510:revInfo xmlns:a="http://schemas.openxmlformats.org/drawingml/2006/main" xmlns:r="http://schemas.openxmlformats.org/officeDocument/2006/relationships" xmlns:p1510="http://schemas.microsoft.com/office/powerpoint/2015/10/main">
+  <p1510:revLst>
+    <p1510:client id="{BB6F1FFB-C1D6-442F-AED1-DB34F2FA3E3D}" v="11" dt="2024-03-14T21:44:19.136"/>
+  </p1510:revLst>
+</p1510:revInfo>
+</file>
+
 <file path=ppt/changesInfos/changesInfo1.xml><?xml version="1.0" encoding="utf-8"?>
 <pc:chgInfo xmlns:a="http://schemas.openxmlformats.org/drawingml/2006/main" xmlns:r="http://schemas.openxmlformats.org/officeDocument/2006/relationships" xmlns:ac="http://schemas.microsoft.com/office/drawing/2013/main/command" xmlns:pc="http://schemas.microsoft.com/office/powerpoint/2013/main/command">
   <pc:docChgLst>
@@ -205,17 +213,32 @@
   </pc:docChgLst>
   <pc:docChgLst>
     <pc:chgData name="Jared Poche" userId="1e6e382f47668c82" providerId="LiveId" clId="{BB6F1FFB-C1D6-442F-AED1-DB34F2FA3E3D}"/>
-    <pc:docChg chg="custSel addSld modSld">
-      <pc:chgData name="Jared Poche" userId="1e6e382f47668c82" providerId="LiveId" clId="{BB6F1FFB-C1D6-442F-AED1-DB34F2FA3E3D}" dt="2022-05-09T19:38:10.350" v="180" actId="33524"/>
+    <pc:docChg chg="undo custSel addSld delSld modSld">
+      <pc:chgData name="Jared Poche" userId="1e6e382f47668c82" providerId="LiveId" clId="{BB6F1FFB-C1D6-442F-AED1-DB34F2FA3E3D}" dt="2024-09-16T14:15:21.668" v="418" actId="47"/>
       <pc:docMkLst>
         <pc:docMk/>
       </pc:docMkLst>
-      <pc:sldChg chg="modNotesTx">
-        <pc:chgData name="Jared Poche" userId="1e6e382f47668c82" providerId="LiveId" clId="{BB6F1FFB-C1D6-442F-AED1-DB34F2FA3E3D}" dt="2022-05-09T19:28:01.027" v="179" actId="20577"/>
+      <pc:sldChg chg="del">
+        <pc:chgData name="Jared Poche" userId="1e6e382f47668c82" providerId="LiveId" clId="{BB6F1FFB-C1D6-442F-AED1-DB34F2FA3E3D}" dt="2024-09-16T14:15:21.668" v="418" actId="47"/>
+        <pc:sldMkLst>
+          <pc:docMk/>
+          <pc:sldMk cId="789172884" sldId="258"/>
+        </pc:sldMkLst>
+      </pc:sldChg>
+      <pc:sldChg chg="modSp mod modNotesTx">
+        <pc:chgData name="Jared Poche" userId="1e6e382f47668c82" providerId="LiveId" clId="{BB6F1FFB-C1D6-442F-AED1-DB34F2FA3E3D}" dt="2024-09-16T14:01:57.987" v="417" actId="1036"/>
         <pc:sldMkLst>
           <pc:docMk/>
           <pc:sldMk cId="480440924" sldId="259"/>
         </pc:sldMkLst>
+        <pc:picChg chg="mod">
+          <ac:chgData name="Jared Poche" userId="1e6e382f47668c82" providerId="LiveId" clId="{BB6F1FFB-C1D6-442F-AED1-DB34F2FA3E3D}" dt="2024-09-16T14:01:57.987" v="417" actId="1036"/>
+          <ac:picMkLst>
+            <pc:docMk/>
+            <pc:sldMk cId="480440924" sldId="259"/>
+            <ac:picMk id="5" creationId="{B46CDA63-3852-4A8D-917C-69BF91C5F2F7}"/>
+          </ac:picMkLst>
+        </pc:picChg>
       </pc:sldChg>
       <pc:sldChg chg="modSp mod">
         <pc:chgData name="Jared Poche" userId="1e6e382f47668c82" providerId="LiveId" clId="{BB6F1FFB-C1D6-442F-AED1-DB34F2FA3E3D}" dt="2022-02-10T01:49:47.654" v="157" actId="313"/>
@@ -229,6 +252,21 @@
             <pc:docMk/>
             <pc:sldMk cId="1574726250" sldId="264"/>
             <ac:spMk id="38" creationId="{AAC03D48-5842-4C3E-B0E3-B56F8A493E32}"/>
+          </ac:spMkLst>
+        </pc:spChg>
+      </pc:sldChg>
+      <pc:sldChg chg="modSp del mod">
+        <pc:chgData name="Jared Poche" userId="1e6e382f47668c82" providerId="LiveId" clId="{BB6F1FFB-C1D6-442F-AED1-DB34F2FA3E3D}" dt="2024-03-14T21:45:12.676" v="393" actId="47"/>
+        <pc:sldMkLst>
+          <pc:docMk/>
+          <pc:sldMk cId="3443376465" sldId="266"/>
+        </pc:sldMkLst>
+        <pc:spChg chg="mod">
+          <ac:chgData name="Jared Poche" userId="1e6e382f47668c82" providerId="LiveId" clId="{BB6F1FFB-C1D6-442F-AED1-DB34F2FA3E3D}" dt="2024-03-14T21:38:04.927" v="235" actId="20577"/>
+          <ac:spMkLst>
+            <pc:docMk/>
+            <pc:sldMk cId="3443376465" sldId="266"/>
+            <ac:spMk id="3" creationId="{92DC58CA-F37E-4A0B-A713-C01F64C96C4D}"/>
           </ac:spMkLst>
         </pc:spChg>
       </pc:sldChg>
@@ -255,6 +293,410 @@
           </ac:spMkLst>
         </pc:spChg>
       </pc:sldChg>
+      <pc:sldChg chg="addSp delSp modSp new mod">
+        <pc:chgData name="Jared Poche" userId="1e6e382f47668c82" providerId="LiveId" clId="{BB6F1FFB-C1D6-442F-AED1-DB34F2FA3E3D}" dt="2024-03-14T22:02:09.650" v="416" actId="20577"/>
+        <pc:sldMkLst>
+          <pc:docMk/>
+          <pc:sldMk cId="2852513115" sldId="269"/>
+        </pc:sldMkLst>
+        <pc:spChg chg="del mod">
+          <ac:chgData name="Jared Poche" userId="1e6e382f47668c82" providerId="LiveId" clId="{BB6F1FFB-C1D6-442F-AED1-DB34F2FA3E3D}" dt="2024-03-14T21:41:15.117" v="275" actId="478"/>
+          <ac:spMkLst>
+            <pc:docMk/>
+            <pc:sldMk cId="2852513115" sldId="269"/>
+            <ac:spMk id="2" creationId="{F3C88AFE-295D-C0B7-DB7E-DB9A8F2CFB36}"/>
+          </ac:spMkLst>
+        </pc:spChg>
+        <pc:spChg chg="del">
+          <ac:chgData name="Jared Poche" userId="1e6e382f47668c82" providerId="LiveId" clId="{BB6F1FFB-C1D6-442F-AED1-DB34F2FA3E3D}" dt="2024-03-14T21:41:17.349" v="276" actId="478"/>
+          <ac:spMkLst>
+            <pc:docMk/>
+            <pc:sldMk cId="2852513115" sldId="269"/>
+            <ac:spMk id="3" creationId="{D8B43A2F-8712-495F-C65B-EE7F62D04759}"/>
+          </ac:spMkLst>
+        </pc:spChg>
+        <pc:spChg chg="add del mod">
+          <ac:chgData name="Jared Poche" userId="1e6e382f47668c82" providerId="LiveId" clId="{BB6F1FFB-C1D6-442F-AED1-DB34F2FA3E3D}" dt="2024-03-14T21:42:59.712" v="320" actId="478"/>
+          <ac:spMkLst>
+            <pc:docMk/>
+            <pc:sldMk cId="2852513115" sldId="269"/>
+            <ac:spMk id="4" creationId="{F6DBBCEA-00C9-767B-4CA7-56D3F4FD60DF}"/>
+          </ac:spMkLst>
+        </pc:spChg>
+        <pc:spChg chg="add del mod">
+          <ac:chgData name="Jared Poche" userId="1e6e382f47668c82" providerId="LiveId" clId="{BB6F1FFB-C1D6-442F-AED1-DB34F2FA3E3D}" dt="2024-03-14T21:42:59.712" v="320" actId="478"/>
+          <ac:spMkLst>
+            <pc:docMk/>
+            <pc:sldMk cId="2852513115" sldId="269"/>
+            <ac:spMk id="5" creationId="{F810A602-308B-93B9-F347-5F03CF1CA819}"/>
+          </ac:spMkLst>
+        </pc:spChg>
+        <pc:spChg chg="add del mod">
+          <ac:chgData name="Jared Poche" userId="1e6e382f47668c82" providerId="LiveId" clId="{BB6F1FFB-C1D6-442F-AED1-DB34F2FA3E3D}" dt="2024-03-14T21:41:25.783" v="277" actId="478"/>
+          <ac:spMkLst>
+            <pc:docMk/>
+            <pc:sldMk cId="2852513115" sldId="269"/>
+            <ac:spMk id="6" creationId="{205CB62D-BF8B-E853-4F82-F1525504B8FD}"/>
+          </ac:spMkLst>
+        </pc:spChg>
+        <pc:spChg chg="add del mod">
+          <ac:chgData name="Jared Poche" userId="1e6e382f47668c82" providerId="LiveId" clId="{BB6F1FFB-C1D6-442F-AED1-DB34F2FA3E3D}" dt="2024-03-14T21:41:48.025" v="278" actId="478"/>
+          <ac:spMkLst>
+            <pc:docMk/>
+            <pc:sldMk cId="2852513115" sldId="269"/>
+            <ac:spMk id="7" creationId="{467BB061-78A8-5829-8F96-61535D59BECE}"/>
+          </ac:spMkLst>
+        </pc:spChg>
+        <pc:spChg chg="add del mod">
+          <ac:chgData name="Jared Poche" userId="1e6e382f47668c82" providerId="LiveId" clId="{BB6F1FFB-C1D6-442F-AED1-DB34F2FA3E3D}" dt="2024-03-14T21:42:59.712" v="320" actId="478"/>
+          <ac:spMkLst>
+            <pc:docMk/>
+            <pc:sldMk cId="2852513115" sldId="269"/>
+            <ac:spMk id="8" creationId="{FBCA90B9-087B-75CA-779A-A1029B3D0B25}"/>
+          </ac:spMkLst>
+        </pc:spChg>
+        <pc:spChg chg="add mod">
+          <ac:chgData name="Jared Poche" userId="1e6e382f47668c82" providerId="LiveId" clId="{BB6F1FFB-C1D6-442F-AED1-DB34F2FA3E3D}" dt="2024-03-14T22:02:09.650" v="416" actId="20577"/>
+          <ac:spMkLst>
+            <pc:docMk/>
+            <pc:sldMk cId="2852513115" sldId="269"/>
+            <ac:spMk id="9" creationId="{F0545DAD-80FA-6F6D-DAF9-1D637CEEA07C}"/>
+          </ac:spMkLst>
+        </pc:spChg>
+        <pc:spChg chg="add del mod">
+          <ac:chgData name="Jared Poche" userId="1e6e382f47668c82" providerId="LiveId" clId="{BB6F1FFB-C1D6-442F-AED1-DB34F2FA3E3D}" dt="2024-03-14T21:42:59.712" v="320" actId="478"/>
+          <ac:spMkLst>
+            <pc:docMk/>
+            <pc:sldMk cId="2852513115" sldId="269"/>
+            <ac:spMk id="10" creationId="{7EEC9284-C378-AA6A-144E-4C947D6C873C}"/>
+          </ac:spMkLst>
+        </pc:spChg>
+        <pc:spChg chg="add del mod">
+          <ac:chgData name="Jared Poche" userId="1e6e382f47668c82" providerId="LiveId" clId="{BB6F1FFB-C1D6-442F-AED1-DB34F2FA3E3D}" dt="2024-03-14T21:42:59.712" v="320" actId="478"/>
+          <ac:spMkLst>
+            <pc:docMk/>
+            <pc:sldMk cId="2852513115" sldId="269"/>
+            <ac:spMk id="11" creationId="{33351E73-C498-4B0D-BD93-C882813D0BBE}"/>
+          </ac:spMkLst>
+        </pc:spChg>
+        <pc:spChg chg="add del mod">
+          <ac:chgData name="Jared Poche" userId="1e6e382f47668c82" providerId="LiveId" clId="{BB6F1FFB-C1D6-442F-AED1-DB34F2FA3E3D}" dt="2024-03-14T21:42:11.636" v="291" actId="478"/>
+          <ac:spMkLst>
+            <pc:docMk/>
+            <pc:sldMk cId="2852513115" sldId="269"/>
+            <ac:spMk id="16" creationId="{9BF7446E-83AA-4344-9033-221979F0DCA3}"/>
+          </ac:spMkLst>
+        </pc:spChg>
+        <pc:spChg chg="add mod">
+          <ac:chgData name="Jared Poche" userId="1e6e382f47668c82" providerId="LiveId" clId="{BB6F1FFB-C1D6-442F-AED1-DB34F2FA3E3D}" dt="2024-03-14T21:41:54.362" v="280" actId="5793"/>
+          <ac:spMkLst>
+            <pc:docMk/>
+            <pc:sldMk cId="2852513115" sldId="269"/>
+            <ac:spMk id="17" creationId="{C7B03435-B58F-5A12-09D6-A1BA920FA7B9}"/>
+          </ac:spMkLst>
+        </pc:spChg>
+        <pc:spChg chg="add mod">
+          <ac:chgData name="Jared Poche" userId="1e6e382f47668c82" providerId="LiveId" clId="{BB6F1FFB-C1D6-442F-AED1-DB34F2FA3E3D}" dt="2024-03-14T21:41:55.450" v="281" actId="5793"/>
+          <ac:spMkLst>
+            <pc:docMk/>
+            <pc:sldMk cId="2852513115" sldId="269"/>
+            <ac:spMk id="18" creationId="{9A2007FB-BB29-8CBB-3FBC-16E1FD3EF369}"/>
+          </ac:spMkLst>
+        </pc:spChg>
+        <pc:spChg chg="add mod">
+          <ac:chgData name="Jared Poche" userId="1e6e382f47668c82" providerId="LiveId" clId="{BB6F1FFB-C1D6-442F-AED1-DB34F2FA3E3D}" dt="2024-03-14T21:42:29.957" v="302" actId="20577"/>
+          <ac:spMkLst>
+            <pc:docMk/>
+            <pc:sldMk cId="2852513115" sldId="269"/>
+            <ac:spMk id="19" creationId="{E4BC9831-3A6A-03F3-3F56-ED4E1E42C7AB}"/>
+          </ac:spMkLst>
+        </pc:spChg>
+        <pc:spChg chg="add mod">
+          <ac:chgData name="Jared Poche" userId="1e6e382f47668c82" providerId="LiveId" clId="{BB6F1FFB-C1D6-442F-AED1-DB34F2FA3E3D}" dt="2024-03-14T21:43:25.853" v="323" actId="368"/>
+          <ac:spMkLst>
+            <pc:docMk/>
+            <pc:sldMk cId="2852513115" sldId="269"/>
+            <ac:spMk id="20" creationId="{6CBC67AA-5D13-104A-F938-32AEA844170C}"/>
+          </ac:spMkLst>
+        </pc:spChg>
+        <pc:spChg chg="add mod">
+          <ac:chgData name="Jared Poche" userId="1e6e382f47668c82" providerId="LiveId" clId="{BB6F1FFB-C1D6-442F-AED1-DB34F2FA3E3D}" dt="2024-03-14T21:43:46.693" v="324"/>
+          <ac:spMkLst>
+            <pc:docMk/>
+            <pc:sldMk cId="2852513115" sldId="269"/>
+            <ac:spMk id="21" creationId="{55891574-11EF-FA5C-689D-FE901DA94AAB}"/>
+          </ac:spMkLst>
+        </pc:spChg>
+        <pc:spChg chg="add mod">
+          <ac:chgData name="Jared Poche" userId="1e6e382f47668c82" providerId="LiveId" clId="{BB6F1FFB-C1D6-442F-AED1-DB34F2FA3E3D}" dt="2024-03-14T21:43:46.693" v="324"/>
+          <ac:spMkLst>
+            <pc:docMk/>
+            <pc:sldMk cId="2852513115" sldId="269"/>
+            <ac:spMk id="22" creationId="{98EEE692-C70D-C440-66B5-C97B7F7F39AC}"/>
+          </ac:spMkLst>
+        </pc:spChg>
+        <pc:spChg chg="add mod">
+          <ac:chgData name="Jared Poche" userId="1e6e382f47668c82" providerId="LiveId" clId="{BB6F1FFB-C1D6-442F-AED1-DB34F2FA3E3D}" dt="2024-03-14T21:44:28.593" v="346" actId="20577"/>
+          <ac:spMkLst>
+            <pc:docMk/>
+            <pc:sldMk cId="2852513115" sldId="269"/>
+            <ac:spMk id="23" creationId="{AAAE8F96-6641-13A5-ED04-BAF1B28FDF00}"/>
+          </ac:spMkLst>
+        </pc:spChg>
+        <pc:spChg chg="add mod">
+          <ac:chgData name="Jared Poche" userId="1e6e382f47668c82" providerId="LiveId" clId="{BB6F1FFB-C1D6-442F-AED1-DB34F2FA3E3D}" dt="2024-03-14T21:44:16.378" v="327"/>
+          <ac:spMkLst>
+            <pc:docMk/>
+            <pc:sldMk cId="2852513115" sldId="269"/>
+            <ac:spMk id="24" creationId="{1BDE920F-632E-F1E5-1C1D-51B6B6192EEF}"/>
+          </ac:spMkLst>
+        </pc:spChg>
+        <pc:spChg chg="add mod">
+          <ac:chgData name="Jared Poche" userId="1e6e382f47668c82" providerId="LiveId" clId="{BB6F1FFB-C1D6-442F-AED1-DB34F2FA3E3D}" dt="2024-03-14T21:44:33.906" v="361" actId="20577"/>
+          <ac:spMkLst>
+            <pc:docMk/>
+            <pc:sldMk cId="2852513115" sldId="269"/>
+            <ac:spMk id="25" creationId="{E999573A-26E3-1A94-7AB8-CD51C8D0338B}"/>
+          </ac:spMkLst>
+        </pc:spChg>
+        <pc:picChg chg="add mod">
+          <ac:chgData name="Jared Poche" userId="1e6e382f47668c82" providerId="LiveId" clId="{BB6F1FFB-C1D6-442F-AED1-DB34F2FA3E3D}" dt="2024-03-14T21:41:07.248" v="271"/>
+          <ac:picMkLst>
+            <pc:docMk/>
+            <pc:sldMk cId="2852513115" sldId="269"/>
+            <ac:picMk id="12" creationId="{48AD7CC0-C77E-388B-FB5B-721287230EFD}"/>
+          </ac:picMkLst>
+        </pc:picChg>
+        <pc:picChg chg="add mod">
+          <ac:chgData name="Jared Poche" userId="1e6e382f47668c82" providerId="LiveId" clId="{BB6F1FFB-C1D6-442F-AED1-DB34F2FA3E3D}" dt="2024-03-14T21:41:07.248" v="271"/>
+          <ac:picMkLst>
+            <pc:docMk/>
+            <pc:sldMk cId="2852513115" sldId="269"/>
+            <ac:picMk id="13" creationId="{BAC9C1F6-88E0-DD64-F95D-F3FD1DBC299D}"/>
+          </ac:picMkLst>
+        </pc:picChg>
+        <pc:picChg chg="add mod">
+          <ac:chgData name="Jared Poche" userId="1e6e382f47668c82" providerId="LiveId" clId="{BB6F1FFB-C1D6-442F-AED1-DB34F2FA3E3D}" dt="2024-03-14T21:41:07.248" v="271"/>
+          <ac:picMkLst>
+            <pc:docMk/>
+            <pc:sldMk cId="2852513115" sldId="269"/>
+            <ac:picMk id="14" creationId="{E77E6D91-65DB-C6FD-07EA-9618AE1C0278}"/>
+          </ac:picMkLst>
+        </pc:picChg>
+        <pc:picChg chg="add mod">
+          <ac:chgData name="Jared Poche" userId="1e6e382f47668c82" providerId="LiveId" clId="{BB6F1FFB-C1D6-442F-AED1-DB34F2FA3E3D}" dt="2024-03-14T21:41:07.248" v="271"/>
+          <ac:picMkLst>
+            <pc:docMk/>
+            <pc:sldMk cId="2852513115" sldId="269"/>
+            <ac:picMk id="15" creationId="{11576D56-A7CD-6D83-183B-0FFEF05F4037}"/>
+          </ac:picMkLst>
+        </pc:picChg>
+      </pc:sldChg>
+      <pc:sldChg chg="addSp delSp modSp add del mod modClrScheme chgLayout">
+        <pc:chgData name="Jared Poche" userId="1e6e382f47668c82" providerId="LiveId" clId="{BB6F1FFB-C1D6-442F-AED1-DB34F2FA3E3D}" dt="2024-03-14T21:45:23.926" v="394" actId="47"/>
+        <pc:sldMkLst>
+          <pc:docMk/>
+          <pc:sldMk cId="1651820072" sldId="305"/>
+        </pc:sldMkLst>
+        <pc:spChg chg="mod ord">
+          <ac:chgData name="Jared Poche" userId="1e6e382f47668c82" providerId="LiveId" clId="{BB6F1FFB-C1D6-442F-AED1-DB34F2FA3E3D}" dt="2024-03-14T21:40:59.230" v="270" actId="1076"/>
+          <ac:spMkLst>
+            <pc:docMk/>
+            <pc:sldMk cId="1651820072" sldId="305"/>
+            <ac:spMk id="2" creationId="{AEADCC9B-D507-6445-8B25-52BE472023F6}"/>
+          </ac:spMkLst>
+        </pc:spChg>
+        <pc:spChg chg="mod ord">
+          <ac:chgData name="Jared Poche" userId="1e6e382f47668c82" providerId="LiveId" clId="{BB6F1FFB-C1D6-442F-AED1-DB34F2FA3E3D}" dt="2024-03-14T21:40:39.150" v="265" actId="700"/>
+          <ac:spMkLst>
+            <pc:docMk/>
+            <pc:sldMk cId="1651820072" sldId="305"/>
+            <ac:spMk id="3" creationId="{7F99F984-5EE3-D946-985F-107BD24A32D9}"/>
+          </ac:spMkLst>
+        </pc:spChg>
+        <pc:spChg chg="add del mod">
+          <ac:chgData name="Jared Poche" userId="1e6e382f47668c82" providerId="LiveId" clId="{BB6F1FFB-C1D6-442F-AED1-DB34F2FA3E3D}" dt="2024-03-14T21:40:25.746" v="262" actId="6264"/>
+          <ac:spMkLst>
+            <pc:docMk/>
+            <pc:sldMk cId="1651820072" sldId="305"/>
+            <ac:spMk id="4" creationId="{8E66DA28-CD9F-80ED-EE37-EDD12C60A76F}"/>
+          </ac:spMkLst>
+        </pc:spChg>
+        <pc:spChg chg="mod ord">
+          <ac:chgData name="Jared Poche" userId="1e6e382f47668c82" providerId="LiveId" clId="{BB6F1FFB-C1D6-442F-AED1-DB34F2FA3E3D}" dt="2024-03-14T21:40:39.150" v="265" actId="700"/>
+          <ac:spMkLst>
+            <pc:docMk/>
+            <pc:sldMk cId="1651820072" sldId="305"/>
+            <ac:spMk id="5" creationId="{9F42CBC0-B7F5-7640-B95A-C8228AED1A05}"/>
+          </ac:spMkLst>
+        </pc:spChg>
+        <pc:spChg chg="mod ord">
+          <ac:chgData name="Jared Poche" userId="1e6e382f47668c82" providerId="LiveId" clId="{BB6F1FFB-C1D6-442F-AED1-DB34F2FA3E3D}" dt="2024-03-14T21:40:39.150" v="265" actId="700"/>
+          <ac:spMkLst>
+            <pc:docMk/>
+            <pc:sldMk cId="1651820072" sldId="305"/>
+            <ac:spMk id="6" creationId="{33635C4D-5EAB-354D-9225-BC04B576C009}"/>
+          </ac:spMkLst>
+        </pc:spChg>
+        <pc:spChg chg="mod ord">
+          <ac:chgData name="Jared Poche" userId="1e6e382f47668c82" providerId="LiveId" clId="{BB6F1FFB-C1D6-442F-AED1-DB34F2FA3E3D}" dt="2024-03-14T21:40:39.150" v="265" actId="700"/>
+          <ac:spMkLst>
+            <pc:docMk/>
+            <pc:sldMk cId="1651820072" sldId="305"/>
+            <ac:spMk id="7" creationId="{81F9E485-670C-8F44-8C45-B464164BEA42}"/>
+          </ac:spMkLst>
+        </pc:spChg>
+        <pc:spChg chg="mod ord">
+          <ac:chgData name="Jared Poche" userId="1e6e382f47668c82" providerId="LiveId" clId="{BB6F1FFB-C1D6-442F-AED1-DB34F2FA3E3D}" dt="2024-03-14T21:40:39.150" v="265" actId="700"/>
+          <ac:spMkLst>
+            <pc:docMk/>
+            <pc:sldMk cId="1651820072" sldId="305"/>
+            <ac:spMk id="8" creationId="{4177444F-EC04-6443-BB89-E14460A223D8}"/>
+          </ac:spMkLst>
+        </pc:spChg>
+        <pc:spChg chg="mod ord">
+          <ac:chgData name="Jared Poche" userId="1e6e382f47668c82" providerId="LiveId" clId="{BB6F1FFB-C1D6-442F-AED1-DB34F2FA3E3D}" dt="2024-03-14T21:40:39.150" v="265" actId="700"/>
+          <ac:spMkLst>
+            <pc:docMk/>
+            <pc:sldMk cId="1651820072" sldId="305"/>
+            <ac:spMk id="10" creationId="{44070677-7761-B14E-83B4-073DA9F60352}"/>
+          </ac:spMkLst>
+        </pc:spChg>
+        <pc:spChg chg="mod ord">
+          <ac:chgData name="Jared Poche" userId="1e6e382f47668c82" providerId="LiveId" clId="{BB6F1FFB-C1D6-442F-AED1-DB34F2FA3E3D}" dt="2024-03-14T21:40:39.150" v="265" actId="700"/>
+          <ac:spMkLst>
+            <pc:docMk/>
+            <pc:sldMk cId="1651820072" sldId="305"/>
+            <ac:spMk id="11" creationId="{72C2EFE8-9608-7346-9A4F-49484BC20A93}"/>
+          </ac:spMkLst>
+        </pc:spChg>
+        <pc:spChg chg="add del mod">
+          <ac:chgData name="Jared Poche" userId="1e6e382f47668c82" providerId="LiveId" clId="{BB6F1FFB-C1D6-442F-AED1-DB34F2FA3E3D}" dt="2024-03-14T21:40:25.746" v="262" actId="6264"/>
+          <ac:spMkLst>
+            <pc:docMk/>
+            <pc:sldMk cId="1651820072" sldId="305"/>
+            <ac:spMk id="13" creationId="{456FDE4B-9C4B-86E0-7BA9-A6B31DACF6AF}"/>
+          </ac:spMkLst>
+        </pc:spChg>
+        <pc:spChg chg="add del mod">
+          <ac:chgData name="Jared Poche" userId="1e6e382f47668c82" providerId="LiveId" clId="{BB6F1FFB-C1D6-442F-AED1-DB34F2FA3E3D}" dt="2024-03-14T21:40:25.746" v="262" actId="6264"/>
+          <ac:spMkLst>
+            <pc:docMk/>
+            <pc:sldMk cId="1651820072" sldId="305"/>
+            <ac:spMk id="16" creationId="{A10C0D46-452D-A484-A58D-031225D185F3}"/>
+          </ac:spMkLst>
+        </pc:spChg>
+        <pc:spChg chg="add del mod">
+          <ac:chgData name="Jared Poche" userId="1e6e382f47668c82" providerId="LiveId" clId="{BB6F1FFB-C1D6-442F-AED1-DB34F2FA3E3D}" dt="2024-03-14T21:40:25.746" v="262" actId="6264"/>
+          <ac:spMkLst>
+            <pc:docMk/>
+            <pc:sldMk cId="1651820072" sldId="305"/>
+            <ac:spMk id="17" creationId="{A12F6B3E-7861-4C66-D625-265E222F8E92}"/>
+          </ac:spMkLst>
+        </pc:spChg>
+        <pc:spChg chg="mod ord">
+          <ac:chgData name="Jared Poche" userId="1e6e382f47668c82" providerId="LiveId" clId="{BB6F1FFB-C1D6-442F-AED1-DB34F2FA3E3D}" dt="2024-03-14T21:40:39.150" v="265" actId="700"/>
+          <ac:spMkLst>
+            <pc:docMk/>
+            <pc:sldMk cId="1651820072" sldId="305"/>
+            <ac:spMk id="18" creationId="{2AB2DBF1-DB5F-D242-B438-4B5B729AADB4}"/>
+          </ac:spMkLst>
+        </pc:spChg>
+        <pc:spChg chg="add del mod">
+          <ac:chgData name="Jared Poche" userId="1e6e382f47668c82" providerId="LiveId" clId="{BB6F1FFB-C1D6-442F-AED1-DB34F2FA3E3D}" dt="2024-03-14T21:40:25.746" v="262" actId="6264"/>
+          <ac:spMkLst>
+            <pc:docMk/>
+            <pc:sldMk cId="1651820072" sldId="305"/>
+            <ac:spMk id="19" creationId="{758A8406-FE2E-2262-47D1-322A436EA8C5}"/>
+          </ac:spMkLst>
+        </pc:spChg>
+        <pc:spChg chg="add del mod">
+          <ac:chgData name="Jared Poche" userId="1e6e382f47668c82" providerId="LiveId" clId="{BB6F1FFB-C1D6-442F-AED1-DB34F2FA3E3D}" dt="2024-03-14T21:40:25.746" v="262" actId="6264"/>
+          <ac:spMkLst>
+            <pc:docMk/>
+            <pc:sldMk cId="1651820072" sldId="305"/>
+            <ac:spMk id="20" creationId="{918D402F-3AB7-8F35-ACD4-DBB4333AFDDE}"/>
+          </ac:spMkLst>
+        </pc:spChg>
+        <pc:spChg chg="add del mod">
+          <ac:chgData name="Jared Poche" userId="1e6e382f47668c82" providerId="LiveId" clId="{BB6F1FFB-C1D6-442F-AED1-DB34F2FA3E3D}" dt="2024-03-14T21:40:25.746" v="262" actId="6264"/>
+          <ac:spMkLst>
+            <pc:docMk/>
+            <pc:sldMk cId="1651820072" sldId="305"/>
+            <ac:spMk id="21" creationId="{2267247B-32EB-F7E3-82AD-FD424D9488EA}"/>
+          </ac:spMkLst>
+        </pc:spChg>
+        <pc:spChg chg="add del mod">
+          <ac:chgData name="Jared Poche" userId="1e6e382f47668c82" providerId="LiveId" clId="{BB6F1FFB-C1D6-442F-AED1-DB34F2FA3E3D}" dt="2024-03-14T21:40:25.746" v="262" actId="6264"/>
+          <ac:spMkLst>
+            <pc:docMk/>
+            <pc:sldMk cId="1651820072" sldId="305"/>
+            <ac:spMk id="22" creationId="{0960D1A5-E1CF-6298-FBE1-48C48F9AB681}"/>
+          </ac:spMkLst>
+        </pc:spChg>
+        <pc:spChg chg="add del mod">
+          <ac:chgData name="Jared Poche" userId="1e6e382f47668c82" providerId="LiveId" clId="{BB6F1FFB-C1D6-442F-AED1-DB34F2FA3E3D}" dt="2024-03-14T21:40:25.746" v="262" actId="6264"/>
+          <ac:spMkLst>
+            <pc:docMk/>
+            <pc:sldMk cId="1651820072" sldId="305"/>
+            <ac:spMk id="23" creationId="{B8F641CD-DD83-3720-A0AB-7EEAC98C6D53}"/>
+          </ac:spMkLst>
+        </pc:spChg>
+        <pc:spChg chg="add del mod ord">
+          <ac:chgData name="Jared Poche" userId="1e6e382f47668c82" providerId="LiveId" clId="{BB6F1FFB-C1D6-442F-AED1-DB34F2FA3E3D}" dt="2024-03-14T21:40:25.746" v="262" actId="6264"/>
+          <ac:spMkLst>
+            <pc:docMk/>
+            <pc:sldMk cId="1651820072" sldId="305"/>
+            <ac:spMk id="24" creationId="{0AE5496D-52C0-230F-B1A5-2F6093CBF0E9}"/>
+          </ac:spMkLst>
+        </pc:spChg>
+        <pc:picChg chg="mod">
+          <ac:chgData name="Jared Poche" userId="1e6e382f47668c82" providerId="LiveId" clId="{BB6F1FFB-C1D6-442F-AED1-DB34F2FA3E3D}" dt="2024-03-14T21:39:21.745" v="238" actId="1076"/>
+          <ac:picMkLst>
+            <pc:docMk/>
+            <pc:sldMk cId="1651820072" sldId="305"/>
+            <ac:picMk id="9" creationId="{320F1AAD-C4C3-8556-B6C0-8E61B129BD36}"/>
+          </ac:picMkLst>
+        </pc:picChg>
+        <pc:picChg chg="mod">
+          <ac:chgData name="Jared Poche" userId="1e6e382f47668c82" providerId="LiveId" clId="{BB6F1FFB-C1D6-442F-AED1-DB34F2FA3E3D}" dt="2024-03-14T21:39:21.745" v="238" actId="1076"/>
+          <ac:picMkLst>
+            <pc:docMk/>
+            <pc:sldMk cId="1651820072" sldId="305"/>
+            <ac:picMk id="12" creationId="{715A9CC7-DCD1-440F-4C6E-D580DE3BB1D0}"/>
+          </ac:picMkLst>
+        </pc:picChg>
+        <pc:picChg chg="mod">
+          <ac:chgData name="Jared Poche" userId="1e6e382f47668c82" providerId="LiveId" clId="{BB6F1FFB-C1D6-442F-AED1-DB34F2FA3E3D}" dt="2024-03-14T21:39:21.745" v="238" actId="1076"/>
+          <ac:picMkLst>
+            <pc:docMk/>
+            <pc:sldMk cId="1651820072" sldId="305"/>
+            <ac:picMk id="15" creationId="{3E7747AC-8AB1-AE40-9A6A-7B3246642D9C}"/>
+          </ac:picMkLst>
+        </pc:picChg>
+      </pc:sldChg>
+      <pc:sldChg chg="add mod modShow">
+        <pc:chgData name="Jared Poche" userId="1e6e382f47668c82" providerId="LiveId" clId="{BB6F1FFB-C1D6-442F-AED1-DB34F2FA3E3D}" dt="2024-03-14T21:45:01.803" v="392" actId="729"/>
+        <pc:sldMkLst>
+          <pc:docMk/>
+          <pc:sldMk cId="2498648738" sldId="306"/>
+        </pc:sldMkLst>
+      </pc:sldChg>
+      <pc:sldMasterChg chg="delSldLayout">
+        <pc:chgData name="Jared Poche" userId="1e6e382f47668c82" providerId="LiveId" clId="{BB6F1FFB-C1D6-442F-AED1-DB34F2FA3E3D}" dt="2024-03-14T21:45:23.926" v="394" actId="47"/>
+        <pc:sldMasterMkLst>
+          <pc:docMk/>
+          <pc:sldMasterMk cId="4004477524" sldId="2147483726"/>
+        </pc:sldMasterMkLst>
+        <pc:sldLayoutChg chg="del">
+          <pc:chgData name="Jared Poche" userId="1e6e382f47668c82" providerId="LiveId" clId="{BB6F1FFB-C1D6-442F-AED1-DB34F2FA3E3D}" dt="2024-03-14T21:45:23.926" v="394" actId="47"/>
+          <pc:sldLayoutMkLst>
+            <pc:docMk/>
+            <pc:sldMasterMk cId="4004477524" sldId="2147483726"/>
+            <pc:sldLayoutMk cId="980568459" sldId="2147483738"/>
+          </pc:sldLayoutMkLst>
+        </pc:sldLayoutChg>
+      </pc:sldMasterChg>
     </pc:docChg>
   </pc:docChgLst>
   <pc:docChgLst>
@@ -738,7 +1180,7 @@
           <a:p>
             <a:fld id="{D70D1238-12F6-465A-AE3E-A7ECE5AEA9AC}" type="datetimeFigureOut">
               <a:rPr lang="en-US" smtClean="0"/>
-              <a:t>5/9/2022</a:t>
+              <a:t>9/16/2024</a:t>
             </a:fld>
             <a:endParaRPr lang="en-US"/>
           </a:p>
@@ -1070,7 +1512,7 @@
           <a:p>
             <a:fld id="{8FC505C0-83C5-44F4-A47D-3D983EF0E92D}" type="slidenum">
               <a:rPr lang="en-US" smtClean="0"/>
-              <a:t>3</a:t>
+              <a:t>4</a:t>
             </a:fld>
             <a:endParaRPr lang="en-US"/>
           </a:p>
@@ -1157,7 +1599,7 @@
           <a:p>
             <a:fld id="{8FC505C0-83C5-44F4-A47D-3D983EF0E92D}" type="slidenum">
               <a:rPr lang="en-US" smtClean="0"/>
-              <a:t>4</a:t>
+              <a:t>5</a:t>
             </a:fld>
             <a:endParaRPr lang="en-US"/>
           </a:p>
@@ -1674,7 +2116,7 @@
           <a:p>
             <a:fld id="{48A87A34-81AB-432B-8DAE-1953F412C126}" type="datetimeFigureOut">
               <a:rPr lang="en-US" smtClean="0"/>
-              <a:t>5/9/2022</a:t>
+              <a:t>9/16/2024</a:t>
             </a:fld>
             <a:endParaRPr lang="en-US" dirty="0"/>
           </a:p>
@@ -1854,7 +2296,7 @@
           <a:p>
             <a:fld id="{48A87A34-81AB-432B-8DAE-1953F412C126}" type="datetimeFigureOut">
               <a:rPr lang="en-US" smtClean="0"/>
-              <a:t>5/9/2022</a:t>
+              <a:t>9/16/2024</a:t>
             </a:fld>
             <a:endParaRPr lang="en-US" dirty="0"/>
           </a:p>
@@ -2038,7 +2480,7 @@
           <a:p>
             <a:fld id="{48A87A34-81AB-432B-8DAE-1953F412C126}" type="datetimeFigureOut">
               <a:rPr lang="en-US" smtClean="0"/>
-              <a:t>5/9/2022</a:t>
+              <a:t>9/16/2024</a:t>
             </a:fld>
             <a:endParaRPr lang="en-US" dirty="0"/>
           </a:p>
@@ -2208,7 +2650,7 @@
           <a:p>
             <a:fld id="{48A87A34-81AB-432B-8DAE-1953F412C126}" type="datetimeFigureOut">
               <a:rPr lang="en-US" smtClean="0"/>
-              <a:t>5/9/2022</a:t>
+              <a:t>9/16/2024</a:t>
             </a:fld>
             <a:endParaRPr lang="en-US" dirty="0"/>
           </a:p>
@@ -2456,7 +2898,7 @@
           <a:p>
             <a:fld id="{48A87A34-81AB-432B-8DAE-1953F412C126}" type="datetimeFigureOut">
               <a:rPr lang="en-US" smtClean="0"/>
-              <a:t>5/9/2022</a:t>
+              <a:t>9/16/2024</a:t>
             </a:fld>
             <a:endParaRPr lang="en-US" dirty="0"/>
           </a:p>
@@ -2693,7 +3135,7 @@
           <a:p>
             <a:fld id="{48A87A34-81AB-432B-8DAE-1953F412C126}" type="datetimeFigureOut">
               <a:rPr lang="en-US" smtClean="0"/>
-              <a:t>5/9/2022</a:t>
+              <a:t>9/16/2024</a:t>
             </a:fld>
             <a:endParaRPr lang="en-US" dirty="0"/>
           </a:p>
@@ -3078,7 +3520,7 @@
           <a:p>
             <a:fld id="{48A87A34-81AB-432B-8DAE-1953F412C126}" type="datetimeFigureOut">
               <a:rPr lang="en-US" smtClean="0"/>
-              <a:t>5/9/2022</a:t>
+              <a:t>9/16/2024</a:t>
             </a:fld>
             <a:endParaRPr lang="en-US" dirty="0"/>
           </a:p>
@@ -3196,7 +3638,7 @@
           <a:p>
             <a:fld id="{48A87A34-81AB-432B-8DAE-1953F412C126}" type="datetimeFigureOut">
               <a:rPr lang="en-US" smtClean="0"/>
-              <a:t>5/9/2022</a:t>
+              <a:t>9/16/2024</a:t>
             </a:fld>
             <a:endParaRPr lang="en-US" dirty="0"/>
           </a:p>
@@ -3291,7 +3733,7 @@
           <a:p>
             <a:fld id="{48A87A34-81AB-432B-8DAE-1953F412C126}" type="datetimeFigureOut">
               <a:rPr lang="en-US" smtClean="0"/>
-              <a:t>5/9/2022</a:t>
+              <a:t>9/16/2024</a:t>
             </a:fld>
             <a:endParaRPr lang="en-US" dirty="0"/>
           </a:p>
@@ -3542,7 +3984,7 @@
           <a:p>
             <a:fld id="{48A87A34-81AB-432B-8DAE-1953F412C126}" type="datetimeFigureOut">
               <a:rPr lang="en-US" smtClean="0"/>
-              <a:t>5/9/2022</a:t>
+              <a:t>9/16/2024</a:t>
             </a:fld>
             <a:endParaRPr lang="en-US" dirty="0"/>
           </a:p>
@@ -3934,7 +4376,7 @@
             <a:fld id="{48A87A34-81AB-432B-8DAE-1953F412C126}" type="datetimeFigureOut">
               <a:rPr lang="en-US" smtClean="0"/>
               <a:pPr/>
-              <a:t>5/9/2022</a:t>
+              <a:t>9/16/2024</a:t>
             </a:fld>
             <a:endParaRPr lang="en-US" dirty="0"/>
           </a:p>
@@ -4153,7 +4595,7 @@
             <a:fld id="{48A87A34-81AB-432B-8DAE-1953F412C126}" type="datetimeFigureOut">
               <a:rPr lang="en-US" smtClean="0"/>
               <a:pPr/>
-              <a:t>5/9/2022</a:t>
+              <a:t>9/16/2024</a:t>
             </a:fld>
             <a:endParaRPr lang="en-US" dirty="0"/>
           </a:p>
@@ -5395,6 +5837,148 @@
 </file>
 
 <file path=ppt/slides/slide2.xml><?xml version="1.0" encoding="utf-8"?>
+<p:sld xmlns:a="http://schemas.openxmlformats.org/drawingml/2006/main" xmlns:r="http://schemas.openxmlformats.org/officeDocument/2006/relationships" xmlns:p="http://schemas.openxmlformats.org/presentationml/2006/main" show="0">
+  <p:cSld>
+    <p:spTree>
+      <p:nvGrpSpPr>
+        <p:cNvPr id="1" name=""/>
+        <p:cNvGrpSpPr/>
+        <p:nvPr/>
+      </p:nvGrpSpPr>
+      <p:grpSpPr>
+        <a:xfrm>
+          <a:off x="0" y="0"/>
+          <a:ext cx="0" cy="0"/>
+          <a:chOff x="0" y="0"/>
+          <a:chExt cx="0" cy="0"/>
+        </a:xfrm>
+      </p:grpSpPr>
+      <p:sp>
+        <p:nvSpPr>
+          <p:cNvPr id="2" name="Title 1">
+            <a:extLst>
+              <a:ext uri="{FF2B5EF4-FFF2-40B4-BE49-F238E27FC236}">
+                <a16:creationId xmlns:a16="http://schemas.microsoft.com/office/drawing/2014/main" id="{30CE8BA4-D747-4147-94F6-F77EF25C092E}"/>
+              </a:ext>
+            </a:extLst>
+          </p:cNvPr>
+          <p:cNvSpPr>
+            <a:spLocks noGrp="1"/>
+          </p:cNvSpPr>
+          <p:nvPr>
+            <p:ph type="title"/>
+          </p:nvPr>
+        </p:nvSpPr>
+        <p:spPr/>
+        <p:txBody>
+          <a:bodyPr/>
+          <a:lstStyle/>
+          <a:p>
+            <a:r>
+              <a:rPr lang="en-US" dirty="0"/>
+              <a:t>About THE Author</a:t>
+            </a:r>
+          </a:p>
+        </p:txBody>
+      </p:sp>
+      <p:sp>
+        <p:nvSpPr>
+          <p:cNvPr id="3" name="Content Placeholder 2">
+            <a:extLst>
+              <a:ext uri="{FF2B5EF4-FFF2-40B4-BE49-F238E27FC236}">
+                <a16:creationId xmlns:a16="http://schemas.microsoft.com/office/drawing/2014/main" id="{92DC58CA-F37E-4A0B-A713-C01F64C96C4D}"/>
+              </a:ext>
+            </a:extLst>
+          </p:cNvPr>
+          <p:cNvSpPr>
+            <a:spLocks noGrp="1"/>
+          </p:cNvSpPr>
+          <p:nvPr>
+            <p:ph idx="1"/>
+          </p:nvPr>
+        </p:nvSpPr>
+        <p:spPr/>
+        <p:txBody>
+          <a:bodyPr/>
+          <a:lstStyle/>
+          <a:p>
+            <a:r>
+              <a:rPr lang="en-US" dirty="0"/>
+              <a:t>Began teaching SQL Server certification classes in 2002</a:t>
+            </a:r>
+          </a:p>
+          <a:p>
+            <a:r>
+              <a:rPr lang="en-US" dirty="0"/>
+              <a:t>Worked in Microsoft CSS for 10 years</a:t>
+            </a:r>
+          </a:p>
+          <a:p>
+            <a:pPr lvl="1"/>
+            <a:r>
+              <a:rPr lang="en-US" dirty="0"/>
+              <a:t>Specialized in performance and storage engine</a:t>
+            </a:r>
+          </a:p>
+          <a:p>
+            <a:r>
+              <a:rPr lang="en-US" dirty="0"/>
+              <a:t>8 years experience in SQL Server development</a:t>
+            </a:r>
+          </a:p>
+          <a:p>
+            <a:r>
+              <a:rPr lang="en-US" dirty="0"/>
+              <a:t>Current working at </a:t>
+            </a:r>
+            <a:r>
+              <a:rPr lang="en-US" dirty="0" err="1"/>
+              <a:t>Incomm</a:t>
+            </a:r>
+            <a:r>
+              <a:rPr lang="en-US" dirty="0"/>
+              <a:t> Payments</a:t>
+            </a:r>
+          </a:p>
+          <a:p>
+            <a:r>
+              <a:rPr lang="en-US" dirty="0"/>
+              <a:t>Regular </a:t>
+            </a:r>
+            <a:r>
+              <a:rPr lang="en-US" dirty="0" err="1"/>
+              <a:t>SQLSaturday</a:t>
+            </a:r>
+            <a:r>
+              <a:rPr lang="en-US" dirty="0"/>
+              <a:t> and PASS Summit speaker</a:t>
+            </a:r>
+          </a:p>
+          <a:p>
+            <a:r>
+              <a:rPr lang="en-US" dirty="0"/>
+              <a:t>Started blogging in 2019 at sqljared.com </a:t>
+            </a:r>
+          </a:p>
+          <a:p>
+            <a:endParaRPr lang="en-US" dirty="0"/>
+          </a:p>
+        </p:txBody>
+      </p:sp>
+    </p:spTree>
+    <p:extLst>
+      <p:ext uri="{BB962C8B-B14F-4D97-AF65-F5344CB8AC3E}">
+        <p14:creationId xmlns:p14="http://schemas.microsoft.com/office/powerpoint/2010/main" val="2498648738"/>
+      </p:ext>
+    </p:extLst>
+  </p:cSld>
+  <p:clrMapOvr>
+    <a:masterClrMapping/>
+  </p:clrMapOvr>
+</p:sld>
+</file>
+
+<file path=ppt/slides/slide3.xml><?xml version="1.0" encoding="utf-8"?>
 <p:sld xmlns:a="http://schemas.openxmlformats.org/drawingml/2006/main" xmlns:r="http://schemas.openxmlformats.org/officeDocument/2006/relationships" xmlns:p="http://schemas.openxmlformats.org/presentationml/2006/main">
   <p:cSld>
     <p:spTree>
@@ -5413,280 +5997,2347 @@
       </p:grpSpPr>
       <p:sp>
         <p:nvSpPr>
-          <p:cNvPr id="2" name="Title 1">
+          <p:cNvPr id="9" name="Content Placeholder 17">
             <a:extLst>
               <a:ext uri="{FF2B5EF4-FFF2-40B4-BE49-F238E27FC236}">
-                <a16:creationId xmlns:a16="http://schemas.microsoft.com/office/drawing/2014/main" id="{30CE8BA4-D747-4147-94F6-F77EF25C092E}"/>
+                <a16:creationId xmlns:a16="http://schemas.microsoft.com/office/drawing/2014/main" id="{F0545DAD-80FA-6F6D-DAF9-1D637CEEA07C}"/>
               </a:ext>
             </a:extLst>
           </p:cNvPr>
-          <p:cNvSpPr>
-            <a:spLocks noGrp="1"/>
-          </p:cNvSpPr>
-          <p:nvPr>
-            <p:ph type="title"/>
-          </p:nvPr>
-        </p:nvSpPr>
-        <p:spPr/>
-        <p:txBody>
-          <a:bodyPr/>
-          <a:lstStyle/>
-          <a:p>
-            <a:r>
-              <a:rPr lang="en-US" dirty="0"/>
-              <a:t>About THE Author</a:t>
-            </a:r>
-          </a:p>
-        </p:txBody>
-      </p:sp>
-      <p:sp>
-        <p:nvSpPr>
-          <p:cNvPr id="3" name="Content Placeholder 2">
+          <p:cNvSpPr txBox="1">
+            <a:spLocks/>
+          </p:cNvSpPr>
+          <p:nvPr/>
+        </p:nvSpPr>
+        <p:spPr>
+          <a:xfrm>
+            <a:off x="6702439" y="2560817"/>
+            <a:ext cx="5065019" cy="3085857"/>
+          </a:xfrm>
+          <a:prstGeom prst="rect">
+            <a:avLst/>
+          </a:prstGeom>
+        </p:spPr>
+        <p:txBody>
+          <a:bodyPr>
+            <a:normAutofit/>
+          </a:bodyPr>
+          <a:lstStyle>
+            <a:lvl1pPr marL="228600" indent="-228600" algn="l" defTabSz="914400" rtl="0" eaLnBrk="1" latinLnBrk="0" hangingPunct="1">
+              <a:lnSpc>
+                <a:spcPct val="120000"/>
+              </a:lnSpc>
+              <a:spcBef>
+                <a:spcPts val="1000"/>
+              </a:spcBef>
+              <a:buClr>
+                <a:schemeClr val="accent1"/>
+              </a:buClr>
+              <a:buSzPct val="100000"/>
+              <a:buFont typeface="Arial" panose="020B0604020202020204" pitchFamily="34" charset="0"/>
+              <a:buChar char="•"/>
+              <a:defRPr sz="2000" kern="1200">
+                <a:solidFill>
+                  <a:schemeClr val="tx1"/>
+                </a:solidFill>
+                <a:effectLst/>
+                <a:latin typeface="+mn-lt"/>
+                <a:ea typeface="+mn-ea"/>
+                <a:cs typeface="+mn-cs"/>
+              </a:defRPr>
+            </a:lvl1pPr>
+            <a:lvl2pPr marL="685800" indent="-228600" algn="l" defTabSz="914400" rtl="0" eaLnBrk="1" latinLnBrk="0" hangingPunct="1">
+              <a:lnSpc>
+                <a:spcPct val="120000"/>
+              </a:lnSpc>
+              <a:spcBef>
+                <a:spcPts val="500"/>
+              </a:spcBef>
+              <a:buClr>
+                <a:schemeClr val="accent1"/>
+              </a:buClr>
+              <a:buSzPct val="100000"/>
+              <a:buFont typeface="Arial" panose="020B0604020202020204" pitchFamily="34" charset="0"/>
+              <a:buChar char="•"/>
+              <a:defRPr sz="1800" kern="1200" cap="none" baseline="0">
+                <a:solidFill>
+                  <a:schemeClr val="tx1"/>
+                </a:solidFill>
+                <a:effectLst/>
+                <a:latin typeface="+mn-lt"/>
+                <a:ea typeface="+mn-ea"/>
+                <a:cs typeface="+mn-cs"/>
+              </a:defRPr>
+            </a:lvl2pPr>
+            <a:lvl3pPr marL="1143000" indent="-228600" algn="l" defTabSz="914400" rtl="0" eaLnBrk="1" latinLnBrk="0" hangingPunct="1">
+              <a:lnSpc>
+                <a:spcPct val="120000"/>
+              </a:lnSpc>
+              <a:spcBef>
+                <a:spcPts val="500"/>
+              </a:spcBef>
+              <a:buClr>
+                <a:schemeClr val="accent1"/>
+              </a:buClr>
+              <a:buSzPct val="100000"/>
+              <a:buFont typeface="Arial" panose="020B0604020202020204" pitchFamily="34" charset="0"/>
+              <a:buChar char="•"/>
+              <a:defRPr sz="1600" kern="1200">
+                <a:solidFill>
+                  <a:schemeClr val="tx1"/>
+                </a:solidFill>
+                <a:effectLst/>
+                <a:latin typeface="+mn-lt"/>
+                <a:ea typeface="+mn-ea"/>
+                <a:cs typeface="+mn-cs"/>
+              </a:defRPr>
+            </a:lvl3pPr>
+            <a:lvl4pPr marL="1600200" indent="-228600" algn="l" defTabSz="914400" rtl="0" eaLnBrk="1" latinLnBrk="0" hangingPunct="1">
+              <a:lnSpc>
+                <a:spcPct val="120000"/>
+              </a:lnSpc>
+              <a:spcBef>
+                <a:spcPts val="500"/>
+              </a:spcBef>
+              <a:buClr>
+                <a:schemeClr val="accent1"/>
+              </a:buClr>
+              <a:buSzPct val="100000"/>
+              <a:buFont typeface="Arial" panose="020B0604020202020204" pitchFamily="34" charset="0"/>
+              <a:buChar char="•"/>
+              <a:defRPr sz="1400" kern="1200" cap="none" baseline="0">
+                <a:solidFill>
+                  <a:schemeClr val="tx1"/>
+                </a:solidFill>
+                <a:effectLst/>
+                <a:latin typeface="+mn-lt"/>
+                <a:ea typeface="+mn-ea"/>
+                <a:cs typeface="+mn-cs"/>
+              </a:defRPr>
+            </a:lvl4pPr>
+            <a:lvl5pPr marL="2057400" indent="-228600" algn="l" defTabSz="914400" rtl="0" eaLnBrk="1" latinLnBrk="0" hangingPunct="1">
+              <a:lnSpc>
+                <a:spcPct val="120000"/>
+              </a:lnSpc>
+              <a:spcBef>
+                <a:spcPts val="500"/>
+              </a:spcBef>
+              <a:buClr>
+                <a:schemeClr val="accent1"/>
+              </a:buClr>
+              <a:buSzPct val="100000"/>
+              <a:buFont typeface="Arial" panose="020B0604020202020204" pitchFamily="34" charset="0"/>
+              <a:buChar char="•"/>
+              <a:defRPr sz="1200" kern="1200">
+                <a:solidFill>
+                  <a:schemeClr val="tx1"/>
+                </a:solidFill>
+                <a:effectLst/>
+                <a:latin typeface="+mn-lt"/>
+                <a:ea typeface="+mn-ea"/>
+                <a:cs typeface="+mn-cs"/>
+              </a:defRPr>
+            </a:lvl5pPr>
+            <a:lvl6pPr marL="2514600" indent="-228600" algn="l" defTabSz="914400" rtl="0" eaLnBrk="1" latinLnBrk="0" hangingPunct="1">
+              <a:lnSpc>
+                <a:spcPct val="120000"/>
+              </a:lnSpc>
+              <a:spcBef>
+                <a:spcPts val="500"/>
+              </a:spcBef>
+              <a:buClr>
+                <a:schemeClr val="accent1"/>
+              </a:buClr>
+              <a:buSzPct val="100000"/>
+              <a:buFont typeface="Arial" panose="020B0604020202020204" pitchFamily="34" charset="0"/>
+              <a:buChar char="•"/>
+              <a:defRPr sz="1200" kern="1200">
+                <a:solidFill>
+                  <a:schemeClr val="tx1"/>
+                </a:solidFill>
+                <a:effectLst/>
+                <a:latin typeface="+mn-lt"/>
+                <a:ea typeface="+mn-ea"/>
+                <a:cs typeface="+mn-cs"/>
+              </a:defRPr>
+            </a:lvl6pPr>
+            <a:lvl7pPr marL="2971800" indent="-228600" algn="l" defTabSz="914400" rtl="0" eaLnBrk="1" latinLnBrk="0" hangingPunct="1">
+              <a:lnSpc>
+                <a:spcPct val="120000"/>
+              </a:lnSpc>
+              <a:spcBef>
+                <a:spcPts val="500"/>
+              </a:spcBef>
+              <a:buClr>
+                <a:schemeClr val="accent1"/>
+              </a:buClr>
+              <a:buSzPct val="100000"/>
+              <a:buFont typeface="Arial" panose="020B0604020202020204" pitchFamily="34" charset="0"/>
+              <a:buChar char="•"/>
+              <a:defRPr sz="1200" kern="1200">
+                <a:solidFill>
+                  <a:schemeClr val="tx1"/>
+                </a:solidFill>
+                <a:effectLst/>
+                <a:latin typeface="+mn-lt"/>
+                <a:ea typeface="+mn-ea"/>
+                <a:cs typeface="+mn-cs"/>
+              </a:defRPr>
+            </a:lvl7pPr>
+            <a:lvl8pPr marL="3429000" indent="-228600" algn="l" defTabSz="914400" rtl="0" eaLnBrk="1" latinLnBrk="0" hangingPunct="1">
+              <a:lnSpc>
+                <a:spcPct val="120000"/>
+              </a:lnSpc>
+              <a:spcBef>
+                <a:spcPts val="500"/>
+              </a:spcBef>
+              <a:buClr>
+                <a:schemeClr val="accent1"/>
+              </a:buClr>
+              <a:buSzPct val="100000"/>
+              <a:buFont typeface="Arial" panose="020B0604020202020204" pitchFamily="34" charset="0"/>
+              <a:buChar char="•"/>
+              <a:defRPr sz="1200" kern="1200" baseline="0">
+                <a:solidFill>
+                  <a:schemeClr val="tx1"/>
+                </a:solidFill>
+                <a:effectLst/>
+                <a:latin typeface="+mn-lt"/>
+                <a:ea typeface="+mn-ea"/>
+                <a:cs typeface="+mn-cs"/>
+              </a:defRPr>
+            </a:lvl8pPr>
+            <a:lvl9pPr marL="3886200" indent="-228600" algn="l" defTabSz="914400" rtl="0" eaLnBrk="1" latinLnBrk="0" hangingPunct="1">
+              <a:lnSpc>
+                <a:spcPct val="120000"/>
+              </a:lnSpc>
+              <a:spcBef>
+                <a:spcPts val="500"/>
+              </a:spcBef>
+              <a:buClr>
+                <a:schemeClr val="accent1"/>
+              </a:buClr>
+              <a:buSzPct val="100000"/>
+              <a:buFont typeface="Arial" panose="020B0604020202020204" pitchFamily="34" charset="0"/>
+              <a:buChar char="•"/>
+              <a:defRPr sz="1200" kern="1200" baseline="0">
+                <a:solidFill>
+                  <a:schemeClr val="tx1"/>
+                </a:solidFill>
+                <a:effectLst/>
+                <a:latin typeface="+mn-lt"/>
+                <a:ea typeface="+mn-ea"/>
+                <a:cs typeface="+mn-cs"/>
+              </a:defRPr>
+            </a:lvl9pPr>
+          </a:lstStyle>
+          <a:p>
+            <a:pPr marL="0" indent="0">
+              <a:buFont typeface="Arial" panose="020B0604020202020204" pitchFamily="34" charset="0"/>
+              <a:buNone/>
+            </a:pPr>
+            <a:r>
+              <a:rPr lang="en-GB" dirty="0"/>
+              <a:t>I’ve worked with SQL Server for 20 years, first in Microsoft CSS and now as a Database Architect focusing on optimization, </a:t>
+            </a:r>
+            <a:r>
+              <a:rPr lang="en-GB"/>
+              <a:t>development and architecture</a:t>
+            </a:r>
+            <a:r>
+              <a:rPr lang="en-GB" dirty="0"/>
+              <a:t>.</a:t>
+            </a:r>
+            <a:br>
+              <a:rPr lang="en-GB" dirty="0"/>
+            </a:br>
+            <a:br>
+              <a:rPr lang="en-GB" dirty="0"/>
+            </a:br>
+            <a:r>
+              <a:rPr lang="en-GB" dirty="0"/>
+              <a:t>Currently working at </a:t>
+            </a:r>
+            <a:r>
+              <a:rPr lang="en-GB" dirty="0" err="1"/>
+              <a:t>Incomm</a:t>
+            </a:r>
+            <a:r>
+              <a:rPr lang="en-GB" dirty="0"/>
+              <a:t> Payments, a fintech company in the US.</a:t>
+            </a:r>
+            <a:endParaRPr lang="en-US" dirty="0"/>
+          </a:p>
+          <a:p>
+            <a:endParaRPr lang="en-US" dirty="0"/>
+          </a:p>
+        </p:txBody>
+      </p:sp>
+      <p:pic>
+        <p:nvPicPr>
+          <p:cNvPr id="12" name="Picture 11">
             <a:extLst>
               <a:ext uri="{FF2B5EF4-FFF2-40B4-BE49-F238E27FC236}">
-                <a16:creationId xmlns:a16="http://schemas.microsoft.com/office/drawing/2014/main" id="{92DC58CA-F37E-4A0B-A713-C01F64C96C4D}"/>
+                <a16:creationId xmlns:a16="http://schemas.microsoft.com/office/drawing/2014/main" id="{48AD7CC0-C77E-388B-FB5B-721287230EFD}"/>
               </a:ext>
             </a:extLst>
           </p:cNvPr>
-          <p:cNvSpPr>
-            <a:spLocks noGrp="1"/>
-          </p:cNvSpPr>
-          <p:nvPr>
-            <p:ph idx="1"/>
-          </p:nvPr>
-        </p:nvSpPr>
-        <p:spPr/>
+          <p:cNvPicPr>
+            <a:picLocks noChangeAspect="1"/>
+          </p:cNvPicPr>
+          <p:nvPr/>
+        </p:nvPicPr>
+        <p:blipFill>
+          <a:blip r:embed="rId2"/>
+          <a:stretch>
+            <a:fillRect/>
+          </a:stretch>
+        </p:blipFill>
+        <p:spPr>
+          <a:xfrm>
+            <a:off x="512804" y="4519568"/>
+            <a:ext cx="356952" cy="291306"/>
+          </a:xfrm>
+          <a:prstGeom prst="rect">
+            <a:avLst/>
+          </a:prstGeom>
+        </p:spPr>
+      </p:pic>
+      <p:pic>
+        <p:nvPicPr>
+          <p:cNvPr id="13" name="Graphic 12">
+            <a:extLst>
+              <a:ext uri="{FF2B5EF4-FFF2-40B4-BE49-F238E27FC236}">
+                <a16:creationId xmlns:a16="http://schemas.microsoft.com/office/drawing/2014/main" id="{BAC9C1F6-88E0-DD64-F95D-F3FD1DBC299D}"/>
+              </a:ext>
+            </a:extLst>
+          </p:cNvPr>
+          <p:cNvPicPr>
+            <a:picLocks noChangeAspect="1"/>
+          </p:cNvPicPr>
+          <p:nvPr/>
+        </p:nvPicPr>
+        <p:blipFill>
+          <a:blip r:embed="rId3">
+            <a:extLst>
+              <a:ext uri="{28A0092B-C50C-407E-A947-70E740481C1C}">
+                <a14:useLocalDpi xmlns:a14="http://schemas.microsoft.com/office/drawing/2010/main" val="0"/>
+              </a:ext>
+              <a:ext uri="{96DAC541-7B7A-43D3-8B79-37D633B846F1}">
+                <asvg:svgBlip xmlns:asvg="http://schemas.microsoft.com/office/drawing/2016/SVG/main" r:embed="rId4"/>
+              </a:ext>
+            </a:extLst>
+          </a:blip>
+          <a:stretch>
+            <a:fillRect/>
+          </a:stretch>
+        </p:blipFill>
+        <p:spPr>
+          <a:xfrm>
+            <a:off x="512804" y="5643838"/>
+            <a:ext cx="368937" cy="368937"/>
+          </a:xfrm>
+          <a:prstGeom prst="rect">
+            <a:avLst/>
+          </a:prstGeom>
+        </p:spPr>
+      </p:pic>
+      <p:pic>
+        <p:nvPicPr>
+          <p:cNvPr id="14" name="Graphic 13">
+            <a:extLst>
+              <a:ext uri="{FF2B5EF4-FFF2-40B4-BE49-F238E27FC236}">
+                <a16:creationId xmlns:a16="http://schemas.microsoft.com/office/drawing/2014/main" id="{E77E6D91-65DB-C6FD-07EA-9618AE1C0278}"/>
+              </a:ext>
+            </a:extLst>
+          </p:cNvPr>
+          <p:cNvPicPr>
+            <a:picLocks noChangeAspect="1"/>
+          </p:cNvPicPr>
+          <p:nvPr/>
+        </p:nvPicPr>
+        <p:blipFill>
+          <a:blip r:embed="rId5">
+            <a:extLst>
+              <a:ext uri="{28A0092B-C50C-407E-A947-70E740481C1C}">
+                <a14:useLocalDpi xmlns:a14="http://schemas.microsoft.com/office/drawing/2010/main" val="0"/>
+              </a:ext>
+              <a:ext uri="{96DAC541-7B7A-43D3-8B79-37D633B846F1}">
+                <asvg:svgBlip xmlns:asvg="http://schemas.microsoft.com/office/drawing/2016/SVG/main" r:embed="rId6"/>
+              </a:ext>
+            </a:extLst>
+          </a:blip>
+          <a:stretch>
+            <a:fillRect/>
+          </a:stretch>
+        </p:blipFill>
+        <p:spPr>
+          <a:xfrm>
+            <a:off x="424541" y="5008114"/>
+            <a:ext cx="457200" cy="457200"/>
+          </a:xfrm>
+          <a:prstGeom prst="rect">
+            <a:avLst/>
+          </a:prstGeom>
+        </p:spPr>
+      </p:pic>
+      <p:pic>
+        <p:nvPicPr>
+          <p:cNvPr id="15" name="Picture Placeholder 14" descr="A person wearing glasses&#10;&#10;Description automatically generated with medium confidence">
+            <a:extLst>
+              <a:ext uri="{FF2B5EF4-FFF2-40B4-BE49-F238E27FC236}">
+                <a16:creationId xmlns:a16="http://schemas.microsoft.com/office/drawing/2014/main" id="{11576D56-A7CD-6D83-183B-0FFEF05F4037}"/>
+              </a:ext>
+            </a:extLst>
+          </p:cNvPr>
+          <p:cNvPicPr>
+            <a:picLocks noChangeAspect="1"/>
+          </p:cNvPicPr>
+          <p:nvPr/>
+        </p:nvPicPr>
+        <p:blipFill>
+          <a:blip r:embed="rId7" cstate="print">
+            <a:extLst>
+              <a:ext uri="{28A0092B-C50C-407E-A947-70E740481C1C}">
+                <a14:useLocalDpi xmlns:a14="http://schemas.microsoft.com/office/drawing/2010/main" val="0"/>
+              </a:ext>
+            </a:extLst>
+          </a:blip>
+          <a:srcRect t="8321" b="8321"/>
+          <a:stretch>
+            <a:fillRect/>
+          </a:stretch>
+        </p:blipFill>
+        <p:spPr bwMode="auto">
+          <a:xfrm>
+            <a:off x="8392245" y="368623"/>
+            <a:ext cx="1685405" cy="1685405"/>
+          </a:xfrm>
+          <a:prstGeom prst="ellipse">
+            <a:avLst/>
+          </a:prstGeom>
+          <a:solidFill>
+            <a:schemeClr val="tx1"/>
+          </a:solidFill>
+          <a:ln>
+            <a:noFill/>
+          </a:ln>
+          <a:extLst>
+            <a:ext uri="{909E8E84-426E-40dd-AFC4-6F175D3DCCD1}">
+              <a14:hiddenFill xmlns="" xmlns:a14="http://schemas.microsoft.com/office/drawing/2010/main">
+                <a:solidFill>
+                  <a:srgbClr val="FFFFFF"/>
+                </a:solidFill>
+              </a14:hiddenFill>
+            </a:ext>
+            <a:ext uri="{91240B29-F687-4f45-9708-019B960494DF}">
+              <a14:hiddenLine xmlns="" xmlns:a14="http://schemas.microsoft.com/office/drawing/2010/main" w="9525">
+                <a:solidFill>
+                  <a:srgbClr val="000000"/>
+                </a:solidFill>
+                <a:miter lim="800000"/>
+                <a:headEnd/>
+                <a:tailEnd/>
+              </a14:hiddenLine>
+            </a:ext>
+          </a:extLst>
+        </p:spPr>
+      </p:pic>
+      <p:sp>
+        <p:nvSpPr>
+          <p:cNvPr id="17" name="Content Placeholder 5">
+            <a:extLst>
+              <a:ext uri="{FF2B5EF4-FFF2-40B4-BE49-F238E27FC236}">
+                <a16:creationId xmlns:a16="http://schemas.microsoft.com/office/drawing/2014/main" id="{C7B03435-B58F-5A12-09D6-A1BA920FA7B9}"/>
+              </a:ext>
+            </a:extLst>
+          </p:cNvPr>
+          <p:cNvSpPr txBox="1">
+            <a:spLocks/>
+          </p:cNvSpPr>
+          <p:nvPr/>
+        </p:nvSpPr>
+        <p:spPr>
+          <a:xfrm>
+            <a:off x="858414" y="5090630"/>
+            <a:ext cx="5601378" cy="553208"/>
+          </a:xfrm>
+          <a:prstGeom prst="rect">
+            <a:avLst/>
+          </a:prstGeom>
+        </p:spPr>
         <p:txBody>
           <a:bodyPr/>
-          <a:lstStyle/>
-          <a:p>
+          <a:lstStyle>
+            <a:lvl1pPr marL="228600" indent="-228600" algn="l" defTabSz="914400" rtl="0" eaLnBrk="1" latinLnBrk="0" hangingPunct="1">
+              <a:lnSpc>
+                <a:spcPct val="120000"/>
+              </a:lnSpc>
+              <a:spcBef>
+                <a:spcPts val="1000"/>
+              </a:spcBef>
+              <a:buClr>
+                <a:schemeClr val="accent1"/>
+              </a:buClr>
+              <a:buSzPct val="100000"/>
+              <a:buFont typeface="Arial" panose="020B0604020202020204" pitchFamily="34" charset="0"/>
+              <a:buChar char="•"/>
+              <a:defRPr sz="2000" kern="1200">
+                <a:solidFill>
+                  <a:schemeClr val="tx1"/>
+                </a:solidFill>
+                <a:effectLst/>
+                <a:latin typeface="+mn-lt"/>
+                <a:ea typeface="+mn-ea"/>
+                <a:cs typeface="+mn-cs"/>
+              </a:defRPr>
+            </a:lvl1pPr>
+            <a:lvl2pPr marL="685800" indent="-228600" algn="l" defTabSz="914400" rtl="0" eaLnBrk="1" latinLnBrk="0" hangingPunct="1">
+              <a:lnSpc>
+                <a:spcPct val="120000"/>
+              </a:lnSpc>
+              <a:spcBef>
+                <a:spcPts val="500"/>
+              </a:spcBef>
+              <a:buClr>
+                <a:schemeClr val="accent1"/>
+              </a:buClr>
+              <a:buSzPct val="100000"/>
+              <a:buFont typeface="Arial" panose="020B0604020202020204" pitchFamily="34" charset="0"/>
+              <a:buChar char="•"/>
+              <a:defRPr sz="1800" kern="1200" cap="none" baseline="0">
+                <a:solidFill>
+                  <a:schemeClr val="tx1"/>
+                </a:solidFill>
+                <a:effectLst/>
+                <a:latin typeface="+mn-lt"/>
+                <a:ea typeface="+mn-ea"/>
+                <a:cs typeface="+mn-cs"/>
+              </a:defRPr>
+            </a:lvl2pPr>
+            <a:lvl3pPr marL="1143000" indent="-228600" algn="l" defTabSz="914400" rtl="0" eaLnBrk="1" latinLnBrk="0" hangingPunct="1">
+              <a:lnSpc>
+                <a:spcPct val="120000"/>
+              </a:lnSpc>
+              <a:spcBef>
+                <a:spcPts val="500"/>
+              </a:spcBef>
+              <a:buClr>
+                <a:schemeClr val="accent1"/>
+              </a:buClr>
+              <a:buSzPct val="100000"/>
+              <a:buFont typeface="Arial" panose="020B0604020202020204" pitchFamily="34" charset="0"/>
+              <a:buChar char="•"/>
+              <a:defRPr sz="1600" kern="1200">
+                <a:solidFill>
+                  <a:schemeClr val="tx1"/>
+                </a:solidFill>
+                <a:effectLst/>
+                <a:latin typeface="+mn-lt"/>
+                <a:ea typeface="+mn-ea"/>
+                <a:cs typeface="+mn-cs"/>
+              </a:defRPr>
+            </a:lvl3pPr>
+            <a:lvl4pPr marL="1600200" indent="-228600" algn="l" defTabSz="914400" rtl="0" eaLnBrk="1" latinLnBrk="0" hangingPunct="1">
+              <a:lnSpc>
+                <a:spcPct val="120000"/>
+              </a:lnSpc>
+              <a:spcBef>
+                <a:spcPts val="500"/>
+              </a:spcBef>
+              <a:buClr>
+                <a:schemeClr val="accent1"/>
+              </a:buClr>
+              <a:buSzPct val="100000"/>
+              <a:buFont typeface="Arial" panose="020B0604020202020204" pitchFamily="34" charset="0"/>
+              <a:buChar char="•"/>
+              <a:defRPr sz="1400" kern="1200" cap="none" baseline="0">
+                <a:solidFill>
+                  <a:schemeClr val="tx1"/>
+                </a:solidFill>
+                <a:effectLst/>
+                <a:latin typeface="+mn-lt"/>
+                <a:ea typeface="+mn-ea"/>
+                <a:cs typeface="+mn-cs"/>
+              </a:defRPr>
+            </a:lvl4pPr>
+            <a:lvl5pPr marL="2057400" indent="-228600" algn="l" defTabSz="914400" rtl="0" eaLnBrk="1" latinLnBrk="0" hangingPunct="1">
+              <a:lnSpc>
+                <a:spcPct val="120000"/>
+              </a:lnSpc>
+              <a:spcBef>
+                <a:spcPts val="500"/>
+              </a:spcBef>
+              <a:buClr>
+                <a:schemeClr val="accent1"/>
+              </a:buClr>
+              <a:buSzPct val="100000"/>
+              <a:buFont typeface="Arial" panose="020B0604020202020204" pitchFamily="34" charset="0"/>
+              <a:buChar char="•"/>
+              <a:defRPr sz="1200" kern="1200">
+                <a:solidFill>
+                  <a:schemeClr val="tx1"/>
+                </a:solidFill>
+                <a:effectLst/>
+                <a:latin typeface="+mn-lt"/>
+                <a:ea typeface="+mn-ea"/>
+                <a:cs typeface="+mn-cs"/>
+              </a:defRPr>
+            </a:lvl5pPr>
+            <a:lvl6pPr marL="2514600" indent="-228600" algn="l" defTabSz="914400" rtl="0" eaLnBrk="1" latinLnBrk="0" hangingPunct="1">
+              <a:lnSpc>
+                <a:spcPct val="120000"/>
+              </a:lnSpc>
+              <a:spcBef>
+                <a:spcPts val="500"/>
+              </a:spcBef>
+              <a:buClr>
+                <a:schemeClr val="accent1"/>
+              </a:buClr>
+              <a:buSzPct val="100000"/>
+              <a:buFont typeface="Arial" panose="020B0604020202020204" pitchFamily="34" charset="0"/>
+              <a:buChar char="•"/>
+              <a:defRPr sz="1200" kern="1200">
+                <a:solidFill>
+                  <a:schemeClr val="tx1"/>
+                </a:solidFill>
+                <a:effectLst/>
+                <a:latin typeface="+mn-lt"/>
+                <a:ea typeface="+mn-ea"/>
+                <a:cs typeface="+mn-cs"/>
+              </a:defRPr>
+            </a:lvl6pPr>
+            <a:lvl7pPr marL="2971800" indent="-228600" algn="l" defTabSz="914400" rtl="0" eaLnBrk="1" latinLnBrk="0" hangingPunct="1">
+              <a:lnSpc>
+                <a:spcPct val="120000"/>
+              </a:lnSpc>
+              <a:spcBef>
+                <a:spcPts val="500"/>
+              </a:spcBef>
+              <a:buClr>
+                <a:schemeClr val="accent1"/>
+              </a:buClr>
+              <a:buSzPct val="100000"/>
+              <a:buFont typeface="Arial" panose="020B0604020202020204" pitchFamily="34" charset="0"/>
+              <a:buChar char="•"/>
+              <a:defRPr sz="1200" kern="1200">
+                <a:solidFill>
+                  <a:schemeClr val="tx1"/>
+                </a:solidFill>
+                <a:effectLst/>
+                <a:latin typeface="+mn-lt"/>
+                <a:ea typeface="+mn-ea"/>
+                <a:cs typeface="+mn-cs"/>
+              </a:defRPr>
+            </a:lvl7pPr>
+            <a:lvl8pPr marL="3429000" indent="-228600" algn="l" defTabSz="914400" rtl="0" eaLnBrk="1" latinLnBrk="0" hangingPunct="1">
+              <a:lnSpc>
+                <a:spcPct val="120000"/>
+              </a:lnSpc>
+              <a:spcBef>
+                <a:spcPts val="500"/>
+              </a:spcBef>
+              <a:buClr>
+                <a:schemeClr val="accent1"/>
+              </a:buClr>
+              <a:buSzPct val="100000"/>
+              <a:buFont typeface="Arial" panose="020B0604020202020204" pitchFamily="34" charset="0"/>
+              <a:buChar char="•"/>
+              <a:defRPr sz="1200" kern="1200" baseline="0">
+                <a:solidFill>
+                  <a:schemeClr val="tx1"/>
+                </a:solidFill>
+                <a:effectLst/>
+                <a:latin typeface="+mn-lt"/>
+                <a:ea typeface="+mn-ea"/>
+                <a:cs typeface="+mn-cs"/>
+              </a:defRPr>
+            </a:lvl8pPr>
+            <a:lvl9pPr marL="3886200" indent="-228600" algn="l" defTabSz="914400" rtl="0" eaLnBrk="1" latinLnBrk="0" hangingPunct="1">
+              <a:lnSpc>
+                <a:spcPct val="120000"/>
+              </a:lnSpc>
+              <a:spcBef>
+                <a:spcPts val="500"/>
+              </a:spcBef>
+              <a:buClr>
+                <a:schemeClr val="accent1"/>
+              </a:buClr>
+              <a:buSzPct val="100000"/>
+              <a:buFont typeface="Arial" panose="020B0604020202020204" pitchFamily="34" charset="0"/>
+              <a:buChar char="•"/>
+              <a:defRPr sz="1200" kern="1200" baseline="0">
+                <a:solidFill>
+                  <a:schemeClr val="tx1"/>
+                </a:solidFill>
+                <a:effectLst/>
+                <a:latin typeface="+mn-lt"/>
+                <a:ea typeface="+mn-ea"/>
+                <a:cs typeface="+mn-cs"/>
+              </a:defRPr>
+            </a:lvl9pPr>
+          </a:lstStyle>
+          <a:p>
+            <a:pPr marL="0" indent="0">
+              <a:buNone/>
+            </a:pPr>
+            <a:r>
+              <a:rPr lang="en-CA" dirty="0"/>
+              <a:t>/</a:t>
+            </a:r>
+            <a:r>
+              <a:rPr lang="en-CA" dirty="0" err="1"/>
+              <a:t>jared</a:t>
+            </a:r>
+            <a:r>
+              <a:rPr lang="en-CA" dirty="0"/>
+              <a:t>-poche</a:t>
+            </a:r>
+          </a:p>
+        </p:txBody>
+      </p:sp>
+      <p:sp>
+        <p:nvSpPr>
+          <p:cNvPr id="18" name="Content Placeholder 6">
+            <a:extLst>
+              <a:ext uri="{FF2B5EF4-FFF2-40B4-BE49-F238E27FC236}">
+                <a16:creationId xmlns:a16="http://schemas.microsoft.com/office/drawing/2014/main" id="{9A2007FB-BB29-8CBB-3FBC-16E1FD3EF369}"/>
+              </a:ext>
+            </a:extLst>
+          </p:cNvPr>
+          <p:cNvSpPr txBox="1">
+            <a:spLocks/>
+          </p:cNvSpPr>
+          <p:nvPr/>
+        </p:nvSpPr>
+        <p:spPr>
+          <a:xfrm>
+            <a:off x="858414" y="5661693"/>
+            <a:ext cx="5601378" cy="553208"/>
+          </a:xfrm>
+          <a:prstGeom prst="rect">
+            <a:avLst/>
+          </a:prstGeom>
+        </p:spPr>
+        <p:txBody>
+          <a:bodyPr/>
+          <a:lstStyle>
+            <a:lvl1pPr marL="228600" indent="-228600" algn="l" defTabSz="914400" rtl="0" eaLnBrk="1" latinLnBrk="0" hangingPunct="1">
+              <a:lnSpc>
+                <a:spcPct val="120000"/>
+              </a:lnSpc>
+              <a:spcBef>
+                <a:spcPts val="1000"/>
+              </a:spcBef>
+              <a:buClr>
+                <a:schemeClr val="accent1"/>
+              </a:buClr>
+              <a:buSzPct val="100000"/>
+              <a:buFont typeface="Arial" panose="020B0604020202020204" pitchFamily="34" charset="0"/>
+              <a:buChar char="•"/>
+              <a:defRPr sz="2000" kern="1200">
+                <a:solidFill>
+                  <a:schemeClr val="tx1"/>
+                </a:solidFill>
+                <a:effectLst/>
+                <a:latin typeface="+mn-lt"/>
+                <a:ea typeface="+mn-ea"/>
+                <a:cs typeface="+mn-cs"/>
+              </a:defRPr>
+            </a:lvl1pPr>
+            <a:lvl2pPr marL="685800" indent="-228600" algn="l" defTabSz="914400" rtl="0" eaLnBrk="1" latinLnBrk="0" hangingPunct="1">
+              <a:lnSpc>
+                <a:spcPct val="120000"/>
+              </a:lnSpc>
+              <a:spcBef>
+                <a:spcPts val="500"/>
+              </a:spcBef>
+              <a:buClr>
+                <a:schemeClr val="accent1"/>
+              </a:buClr>
+              <a:buSzPct val="100000"/>
+              <a:buFont typeface="Arial" panose="020B0604020202020204" pitchFamily="34" charset="0"/>
+              <a:buChar char="•"/>
+              <a:defRPr sz="1800" kern="1200" cap="none" baseline="0">
+                <a:solidFill>
+                  <a:schemeClr val="tx1"/>
+                </a:solidFill>
+                <a:effectLst/>
+                <a:latin typeface="+mn-lt"/>
+                <a:ea typeface="+mn-ea"/>
+                <a:cs typeface="+mn-cs"/>
+              </a:defRPr>
+            </a:lvl2pPr>
+            <a:lvl3pPr marL="1143000" indent="-228600" algn="l" defTabSz="914400" rtl="0" eaLnBrk="1" latinLnBrk="0" hangingPunct="1">
+              <a:lnSpc>
+                <a:spcPct val="120000"/>
+              </a:lnSpc>
+              <a:spcBef>
+                <a:spcPts val="500"/>
+              </a:spcBef>
+              <a:buClr>
+                <a:schemeClr val="accent1"/>
+              </a:buClr>
+              <a:buSzPct val="100000"/>
+              <a:buFont typeface="Arial" panose="020B0604020202020204" pitchFamily="34" charset="0"/>
+              <a:buChar char="•"/>
+              <a:defRPr sz="1600" kern="1200">
+                <a:solidFill>
+                  <a:schemeClr val="tx1"/>
+                </a:solidFill>
+                <a:effectLst/>
+                <a:latin typeface="+mn-lt"/>
+                <a:ea typeface="+mn-ea"/>
+                <a:cs typeface="+mn-cs"/>
+              </a:defRPr>
+            </a:lvl3pPr>
+            <a:lvl4pPr marL="1600200" indent="-228600" algn="l" defTabSz="914400" rtl="0" eaLnBrk="1" latinLnBrk="0" hangingPunct="1">
+              <a:lnSpc>
+                <a:spcPct val="120000"/>
+              </a:lnSpc>
+              <a:spcBef>
+                <a:spcPts val="500"/>
+              </a:spcBef>
+              <a:buClr>
+                <a:schemeClr val="accent1"/>
+              </a:buClr>
+              <a:buSzPct val="100000"/>
+              <a:buFont typeface="Arial" panose="020B0604020202020204" pitchFamily="34" charset="0"/>
+              <a:buChar char="•"/>
+              <a:defRPr sz="1400" kern="1200" cap="none" baseline="0">
+                <a:solidFill>
+                  <a:schemeClr val="tx1"/>
+                </a:solidFill>
+                <a:effectLst/>
+                <a:latin typeface="+mn-lt"/>
+                <a:ea typeface="+mn-ea"/>
+                <a:cs typeface="+mn-cs"/>
+              </a:defRPr>
+            </a:lvl4pPr>
+            <a:lvl5pPr marL="2057400" indent="-228600" algn="l" defTabSz="914400" rtl="0" eaLnBrk="1" latinLnBrk="0" hangingPunct="1">
+              <a:lnSpc>
+                <a:spcPct val="120000"/>
+              </a:lnSpc>
+              <a:spcBef>
+                <a:spcPts val="500"/>
+              </a:spcBef>
+              <a:buClr>
+                <a:schemeClr val="accent1"/>
+              </a:buClr>
+              <a:buSzPct val="100000"/>
+              <a:buFont typeface="Arial" panose="020B0604020202020204" pitchFamily="34" charset="0"/>
+              <a:buChar char="•"/>
+              <a:defRPr sz="1200" kern="1200">
+                <a:solidFill>
+                  <a:schemeClr val="tx1"/>
+                </a:solidFill>
+                <a:effectLst/>
+                <a:latin typeface="+mn-lt"/>
+                <a:ea typeface="+mn-ea"/>
+                <a:cs typeface="+mn-cs"/>
+              </a:defRPr>
+            </a:lvl5pPr>
+            <a:lvl6pPr marL="2514600" indent="-228600" algn="l" defTabSz="914400" rtl="0" eaLnBrk="1" latinLnBrk="0" hangingPunct="1">
+              <a:lnSpc>
+                <a:spcPct val="120000"/>
+              </a:lnSpc>
+              <a:spcBef>
+                <a:spcPts val="500"/>
+              </a:spcBef>
+              <a:buClr>
+                <a:schemeClr val="accent1"/>
+              </a:buClr>
+              <a:buSzPct val="100000"/>
+              <a:buFont typeface="Arial" panose="020B0604020202020204" pitchFamily="34" charset="0"/>
+              <a:buChar char="•"/>
+              <a:defRPr sz="1200" kern="1200">
+                <a:solidFill>
+                  <a:schemeClr val="tx1"/>
+                </a:solidFill>
+                <a:effectLst/>
+                <a:latin typeface="+mn-lt"/>
+                <a:ea typeface="+mn-ea"/>
+                <a:cs typeface="+mn-cs"/>
+              </a:defRPr>
+            </a:lvl6pPr>
+            <a:lvl7pPr marL="2971800" indent="-228600" algn="l" defTabSz="914400" rtl="0" eaLnBrk="1" latinLnBrk="0" hangingPunct="1">
+              <a:lnSpc>
+                <a:spcPct val="120000"/>
+              </a:lnSpc>
+              <a:spcBef>
+                <a:spcPts val="500"/>
+              </a:spcBef>
+              <a:buClr>
+                <a:schemeClr val="accent1"/>
+              </a:buClr>
+              <a:buSzPct val="100000"/>
+              <a:buFont typeface="Arial" panose="020B0604020202020204" pitchFamily="34" charset="0"/>
+              <a:buChar char="•"/>
+              <a:defRPr sz="1200" kern="1200">
+                <a:solidFill>
+                  <a:schemeClr val="tx1"/>
+                </a:solidFill>
+                <a:effectLst/>
+                <a:latin typeface="+mn-lt"/>
+                <a:ea typeface="+mn-ea"/>
+                <a:cs typeface="+mn-cs"/>
+              </a:defRPr>
+            </a:lvl7pPr>
+            <a:lvl8pPr marL="3429000" indent="-228600" algn="l" defTabSz="914400" rtl="0" eaLnBrk="1" latinLnBrk="0" hangingPunct="1">
+              <a:lnSpc>
+                <a:spcPct val="120000"/>
+              </a:lnSpc>
+              <a:spcBef>
+                <a:spcPts val="500"/>
+              </a:spcBef>
+              <a:buClr>
+                <a:schemeClr val="accent1"/>
+              </a:buClr>
+              <a:buSzPct val="100000"/>
+              <a:buFont typeface="Arial" panose="020B0604020202020204" pitchFamily="34" charset="0"/>
+              <a:buChar char="•"/>
+              <a:defRPr sz="1200" kern="1200" baseline="0">
+                <a:solidFill>
+                  <a:schemeClr val="tx1"/>
+                </a:solidFill>
+                <a:effectLst/>
+                <a:latin typeface="+mn-lt"/>
+                <a:ea typeface="+mn-ea"/>
+                <a:cs typeface="+mn-cs"/>
+              </a:defRPr>
+            </a:lvl8pPr>
+            <a:lvl9pPr marL="3886200" indent="-228600" algn="l" defTabSz="914400" rtl="0" eaLnBrk="1" latinLnBrk="0" hangingPunct="1">
+              <a:lnSpc>
+                <a:spcPct val="120000"/>
+              </a:lnSpc>
+              <a:spcBef>
+                <a:spcPts val="500"/>
+              </a:spcBef>
+              <a:buClr>
+                <a:schemeClr val="accent1"/>
+              </a:buClr>
+              <a:buSzPct val="100000"/>
+              <a:buFont typeface="Arial" panose="020B0604020202020204" pitchFamily="34" charset="0"/>
+              <a:buChar char="•"/>
+              <a:defRPr sz="1200" kern="1200" baseline="0">
+                <a:solidFill>
+                  <a:schemeClr val="tx1"/>
+                </a:solidFill>
+                <a:effectLst/>
+                <a:latin typeface="+mn-lt"/>
+                <a:ea typeface="+mn-ea"/>
+                <a:cs typeface="+mn-cs"/>
+              </a:defRPr>
+            </a:lvl9pPr>
+          </a:lstStyle>
+          <a:p>
+            <a:pPr marL="0" indent="0">
+              <a:buNone/>
+            </a:pPr>
             <a:r>
               <a:rPr lang="en-US" dirty="0"/>
-              <a:t>Began teaching SQL Server certification classes in 2002</a:t>
-            </a:r>
-          </a:p>
-          <a:p>
-            <a:r>
-              <a:rPr lang="en-US" dirty="0"/>
-              <a:t>Worked in Microsoft CSS for 10 years</a:t>
-            </a:r>
-          </a:p>
-          <a:p>
-            <a:pPr lvl="1"/>
-            <a:r>
-              <a:rPr lang="en-US" dirty="0"/>
-              <a:t>Specialized in performance and storage engine</a:t>
-            </a:r>
-          </a:p>
-          <a:p>
-            <a:r>
-              <a:rPr lang="en-US" dirty="0"/>
-              <a:t>5 years experience in SQL Server development</a:t>
-            </a:r>
-          </a:p>
-          <a:p>
-            <a:r>
-              <a:rPr lang="en-US" dirty="0"/>
-              <a:t>Current working at </a:t>
-            </a:r>
-            <a:r>
-              <a:rPr lang="en-US" dirty="0" err="1"/>
-              <a:t>ChannelAdvisor</a:t>
-            </a:r>
-            <a:endParaRPr lang="en-US" dirty="0"/>
-          </a:p>
-          <a:p>
-            <a:r>
-              <a:rPr lang="en-US" dirty="0"/>
-              <a:t>Regular </a:t>
-            </a:r>
-            <a:r>
-              <a:rPr lang="en-US" dirty="0" err="1"/>
-              <a:t>SQLSaturday</a:t>
-            </a:r>
-            <a:r>
-              <a:rPr lang="en-US" dirty="0"/>
-              <a:t> speaker</a:t>
-            </a:r>
-          </a:p>
-          <a:p>
-            <a:r>
-              <a:rPr lang="en-US" dirty="0"/>
-              <a:t>Started blogging in 2019 at sqljared.com </a:t>
-            </a:r>
-          </a:p>
-          <a:p>
-            <a:endParaRPr lang="en-US" dirty="0"/>
+              <a:t>sqljared.com</a:t>
+            </a:r>
+          </a:p>
+        </p:txBody>
+      </p:sp>
+      <p:sp>
+        <p:nvSpPr>
+          <p:cNvPr id="19" name="Content Placeholder 5">
+            <a:extLst>
+              <a:ext uri="{FF2B5EF4-FFF2-40B4-BE49-F238E27FC236}">
+                <a16:creationId xmlns:a16="http://schemas.microsoft.com/office/drawing/2014/main" id="{E4BC9831-3A6A-03F3-3F56-ED4E1E42C7AB}"/>
+              </a:ext>
+            </a:extLst>
+          </p:cNvPr>
+          <p:cNvSpPr txBox="1">
+            <a:spLocks/>
+          </p:cNvSpPr>
+          <p:nvPr/>
+        </p:nvSpPr>
+        <p:spPr>
+          <a:xfrm>
+            <a:off x="858414" y="4519567"/>
+            <a:ext cx="5601378" cy="553208"/>
+          </a:xfrm>
+          <a:prstGeom prst="rect">
+            <a:avLst/>
+          </a:prstGeom>
+        </p:spPr>
+        <p:txBody>
+          <a:bodyPr/>
+          <a:lstStyle>
+            <a:lvl1pPr marL="228600" indent="-228600" algn="l" defTabSz="914400" rtl="0" eaLnBrk="1" latinLnBrk="0" hangingPunct="1">
+              <a:lnSpc>
+                <a:spcPct val="120000"/>
+              </a:lnSpc>
+              <a:spcBef>
+                <a:spcPts val="1000"/>
+              </a:spcBef>
+              <a:buClr>
+                <a:schemeClr val="accent1"/>
+              </a:buClr>
+              <a:buSzPct val="100000"/>
+              <a:buFont typeface="Arial" panose="020B0604020202020204" pitchFamily="34" charset="0"/>
+              <a:buChar char="•"/>
+              <a:defRPr sz="2000" kern="1200">
+                <a:solidFill>
+                  <a:schemeClr val="tx1"/>
+                </a:solidFill>
+                <a:effectLst/>
+                <a:latin typeface="+mn-lt"/>
+                <a:ea typeface="+mn-ea"/>
+                <a:cs typeface="+mn-cs"/>
+              </a:defRPr>
+            </a:lvl1pPr>
+            <a:lvl2pPr marL="685800" indent="-228600" algn="l" defTabSz="914400" rtl="0" eaLnBrk="1" latinLnBrk="0" hangingPunct="1">
+              <a:lnSpc>
+                <a:spcPct val="120000"/>
+              </a:lnSpc>
+              <a:spcBef>
+                <a:spcPts val="500"/>
+              </a:spcBef>
+              <a:buClr>
+                <a:schemeClr val="accent1"/>
+              </a:buClr>
+              <a:buSzPct val="100000"/>
+              <a:buFont typeface="Arial" panose="020B0604020202020204" pitchFamily="34" charset="0"/>
+              <a:buChar char="•"/>
+              <a:defRPr sz="1800" kern="1200" cap="none" baseline="0">
+                <a:solidFill>
+                  <a:schemeClr val="tx1"/>
+                </a:solidFill>
+                <a:effectLst/>
+                <a:latin typeface="+mn-lt"/>
+                <a:ea typeface="+mn-ea"/>
+                <a:cs typeface="+mn-cs"/>
+              </a:defRPr>
+            </a:lvl2pPr>
+            <a:lvl3pPr marL="1143000" indent="-228600" algn="l" defTabSz="914400" rtl="0" eaLnBrk="1" latinLnBrk="0" hangingPunct="1">
+              <a:lnSpc>
+                <a:spcPct val="120000"/>
+              </a:lnSpc>
+              <a:spcBef>
+                <a:spcPts val="500"/>
+              </a:spcBef>
+              <a:buClr>
+                <a:schemeClr val="accent1"/>
+              </a:buClr>
+              <a:buSzPct val="100000"/>
+              <a:buFont typeface="Arial" panose="020B0604020202020204" pitchFamily="34" charset="0"/>
+              <a:buChar char="•"/>
+              <a:defRPr sz="1600" kern="1200">
+                <a:solidFill>
+                  <a:schemeClr val="tx1"/>
+                </a:solidFill>
+                <a:effectLst/>
+                <a:latin typeface="+mn-lt"/>
+                <a:ea typeface="+mn-ea"/>
+                <a:cs typeface="+mn-cs"/>
+              </a:defRPr>
+            </a:lvl3pPr>
+            <a:lvl4pPr marL="1600200" indent="-228600" algn="l" defTabSz="914400" rtl="0" eaLnBrk="1" latinLnBrk="0" hangingPunct="1">
+              <a:lnSpc>
+                <a:spcPct val="120000"/>
+              </a:lnSpc>
+              <a:spcBef>
+                <a:spcPts val="500"/>
+              </a:spcBef>
+              <a:buClr>
+                <a:schemeClr val="accent1"/>
+              </a:buClr>
+              <a:buSzPct val="100000"/>
+              <a:buFont typeface="Arial" panose="020B0604020202020204" pitchFamily="34" charset="0"/>
+              <a:buChar char="•"/>
+              <a:defRPr sz="1400" kern="1200" cap="none" baseline="0">
+                <a:solidFill>
+                  <a:schemeClr val="tx1"/>
+                </a:solidFill>
+                <a:effectLst/>
+                <a:latin typeface="+mn-lt"/>
+                <a:ea typeface="+mn-ea"/>
+                <a:cs typeface="+mn-cs"/>
+              </a:defRPr>
+            </a:lvl4pPr>
+            <a:lvl5pPr marL="2057400" indent="-228600" algn="l" defTabSz="914400" rtl="0" eaLnBrk="1" latinLnBrk="0" hangingPunct="1">
+              <a:lnSpc>
+                <a:spcPct val="120000"/>
+              </a:lnSpc>
+              <a:spcBef>
+                <a:spcPts val="500"/>
+              </a:spcBef>
+              <a:buClr>
+                <a:schemeClr val="accent1"/>
+              </a:buClr>
+              <a:buSzPct val="100000"/>
+              <a:buFont typeface="Arial" panose="020B0604020202020204" pitchFamily="34" charset="0"/>
+              <a:buChar char="•"/>
+              <a:defRPr sz="1200" kern="1200">
+                <a:solidFill>
+                  <a:schemeClr val="tx1"/>
+                </a:solidFill>
+                <a:effectLst/>
+                <a:latin typeface="+mn-lt"/>
+                <a:ea typeface="+mn-ea"/>
+                <a:cs typeface="+mn-cs"/>
+              </a:defRPr>
+            </a:lvl5pPr>
+            <a:lvl6pPr marL="2514600" indent="-228600" algn="l" defTabSz="914400" rtl="0" eaLnBrk="1" latinLnBrk="0" hangingPunct="1">
+              <a:lnSpc>
+                <a:spcPct val="120000"/>
+              </a:lnSpc>
+              <a:spcBef>
+                <a:spcPts val="500"/>
+              </a:spcBef>
+              <a:buClr>
+                <a:schemeClr val="accent1"/>
+              </a:buClr>
+              <a:buSzPct val="100000"/>
+              <a:buFont typeface="Arial" panose="020B0604020202020204" pitchFamily="34" charset="0"/>
+              <a:buChar char="•"/>
+              <a:defRPr sz="1200" kern="1200">
+                <a:solidFill>
+                  <a:schemeClr val="tx1"/>
+                </a:solidFill>
+                <a:effectLst/>
+                <a:latin typeface="+mn-lt"/>
+                <a:ea typeface="+mn-ea"/>
+                <a:cs typeface="+mn-cs"/>
+              </a:defRPr>
+            </a:lvl6pPr>
+            <a:lvl7pPr marL="2971800" indent="-228600" algn="l" defTabSz="914400" rtl="0" eaLnBrk="1" latinLnBrk="0" hangingPunct="1">
+              <a:lnSpc>
+                <a:spcPct val="120000"/>
+              </a:lnSpc>
+              <a:spcBef>
+                <a:spcPts val="500"/>
+              </a:spcBef>
+              <a:buClr>
+                <a:schemeClr val="accent1"/>
+              </a:buClr>
+              <a:buSzPct val="100000"/>
+              <a:buFont typeface="Arial" panose="020B0604020202020204" pitchFamily="34" charset="0"/>
+              <a:buChar char="•"/>
+              <a:defRPr sz="1200" kern="1200">
+                <a:solidFill>
+                  <a:schemeClr val="tx1"/>
+                </a:solidFill>
+                <a:effectLst/>
+                <a:latin typeface="+mn-lt"/>
+                <a:ea typeface="+mn-ea"/>
+                <a:cs typeface="+mn-cs"/>
+              </a:defRPr>
+            </a:lvl7pPr>
+            <a:lvl8pPr marL="3429000" indent="-228600" algn="l" defTabSz="914400" rtl="0" eaLnBrk="1" latinLnBrk="0" hangingPunct="1">
+              <a:lnSpc>
+                <a:spcPct val="120000"/>
+              </a:lnSpc>
+              <a:spcBef>
+                <a:spcPts val="500"/>
+              </a:spcBef>
+              <a:buClr>
+                <a:schemeClr val="accent1"/>
+              </a:buClr>
+              <a:buSzPct val="100000"/>
+              <a:buFont typeface="Arial" panose="020B0604020202020204" pitchFamily="34" charset="0"/>
+              <a:buChar char="•"/>
+              <a:defRPr sz="1200" kern="1200" baseline="0">
+                <a:solidFill>
+                  <a:schemeClr val="tx1"/>
+                </a:solidFill>
+                <a:effectLst/>
+                <a:latin typeface="+mn-lt"/>
+                <a:ea typeface="+mn-ea"/>
+                <a:cs typeface="+mn-cs"/>
+              </a:defRPr>
+            </a:lvl8pPr>
+            <a:lvl9pPr marL="3886200" indent="-228600" algn="l" defTabSz="914400" rtl="0" eaLnBrk="1" latinLnBrk="0" hangingPunct="1">
+              <a:lnSpc>
+                <a:spcPct val="120000"/>
+              </a:lnSpc>
+              <a:spcBef>
+                <a:spcPts val="500"/>
+              </a:spcBef>
+              <a:buClr>
+                <a:schemeClr val="accent1"/>
+              </a:buClr>
+              <a:buSzPct val="100000"/>
+              <a:buFont typeface="Arial" panose="020B0604020202020204" pitchFamily="34" charset="0"/>
+              <a:buChar char="•"/>
+              <a:defRPr sz="1200" kern="1200" baseline="0">
+                <a:solidFill>
+                  <a:schemeClr val="tx1"/>
+                </a:solidFill>
+                <a:effectLst/>
+                <a:latin typeface="+mn-lt"/>
+                <a:ea typeface="+mn-ea"/>
+                <a:cs typeface="+mn-cs"/>
+              </a:defRPr>
+            </a:lvl9pPr>
+          </a:lstStyle>
+          <a:p>
+            <a:pPr marL="0" indent="0">
+              <a:buNone/>
+            </a:pPr>
+            <a:r>
+              <a:rPr lang="en-CA" dirty="0"/>
+              <a:t>@sqljared</a:t>
+            </a:r>
+          </a:p>
+        </p:txBody>
+      </p:sp>
+      <p:sp>
+        <p:nvSpPr>
+          <p:cNvPr id="21" name="Title 1">
+            <a:extLst>
+              <a:ext uri="{FF2B5EF4-FFF2-40B4-BE49-F238E27FC236}">
+                <a16:creationId xmlns:a16="http://schemas.microsoft.com/office/drawing/2014/main" id="{55891574-11EF-FA5C-689D-FE901DA94AAB}"/>
+              </a:ext>
+            </a:extLst>
+          </p:cNvPr>
+          <p:cNvSpPr txBox="1">
+            <a:spLocks/>
+          </p:cNvSpPr>
+          <p:nvPr/>
+        </p:nvSpPr>
+        <p:spPr bwMode="auto">
+          <a:xfrm>
+            <a:off x="424541" y="451274"/>
+            <a:ext cx="6137623" cy="711882"/>
+          </a:xfrm>
+          <a:prstGeom prst="rect">
+            <a:avLst/>
+          </a:prstGeom>
+          <a:noFill/>
+          <a:ln>
+            <a:noFill/>
+          </a:ln>
+          <a:extLst>
+            <a:ext uri="{909E8E84-426E-40dd-AFC4-6F175D3DCCD1}">
+              <a14:hiddenFill xmlns="" xmlns:a14="http://schemas.microsoft.com/office/drawing/2010/main">
+                <a:solidFill>
+                  <a:srgbClr val="FFFFFF"/>
+                </a:solidFill>
+              </a14:hiddenFill>
+            </a:ext>
+            <a:ext uri="{91240B29-F687-4f45-9708-019B960494DF}">
+              <a14:hiddenLine xmlns="" xmlns:a14="http://schemas.microsoft.com/office/drawing/2010/main" w="9525">
+                <a:solidFill>
+                  <a:srgbClr val="000000"/>
+                </a:solidFill>
+                <a:miter lim="800000"/>
+                <a:headEnd/>
+                <a:tailEnd/>
+              </a14:hiddenLine>
+            </a:ext>
+          </a:extLst>
+        </p:spPr>
+        <p:txBody>
+          <a:bodyPr vert="horz" wrap="square" lIns="91440" tIns="45720" rIns="91440" bIns="45720" numCol="1" anchor="t" anchorCtr="0" compatLnSpc="1">
+            <a:prstTxWarp prst="textNoShape">
+              <a:avLst/>
+            </a:prstTxWarp>
+            <a:noAutofit/>
+          </a:bodyPr>
+          <a:lstStyle>
+            <a:lvl1pPr marL="0" marR="0" indent="0" algn="l" defTabSz="914400" rtl="0" eaLnBrk="1" fontAlgn="base" latinLnBrk="0" hangingPunct="1">
+              <a:lnSpc>
+                <a:spcPct val="90000"/>
+              </a:lnSpc>
+              <a:spcBef>
+                <a:spcPct val="0"/>
+              </a:spcBef>
+              <a:spcAft>
+                <a:spcPct val="0"/>
+              </a:spcAft>
+              <a:buClrTx/>
+              <a:buSzTx/>
+              <a:buFontTx/>
+              <a:buNone/>
+              <a:tabLst/>
+              <a:defRPr sz="6000" b="1" i="0" kern="1200">
+                <a:solidFill>
+                  <a:srgbClr val="F2F2F2"/>
+                </a:solidFill>
+                <a:latin typeface="IBM Plex Sans" panose="020B0503050203000203" pitchFamily="34" charset="77"/>
+                <a:ea typeface="+mj-ea"/>
+                <a:cs typeface="IBM Plex Sans" panose="020B0503050203000203" pitchFamily="34" charset="77"/>
+              </a:defRPr>
+            </a:lvl1pPr>
+            <a:lvl2pPr algn="l" rtl="0" eaLnBrk="1" fontAlgn="base" hangingPunct="1">
+              <a:lnSpc>
+                <a:spcPct val="90000"/>
+              </a:lnSpc>
+              <a:spcBef>
+                <a:spcPct val="0"/>
+              </a:spcBef>
+              <a:spcAft>
+                <a:spcPct val="0"/>
+              </a:spcAft>
+              <a:defRPr sz="4400">
+                <a:solidFill>
+                  <a:schemeClr val="tx1"/>
+                </a:solidFill>
+                <a:latin typeface="Calibri Light" panose="020F0302020204030204" pitchFamily="34" charset="0"/>
+              </a:defRPr>
+            </a:lvl2pPr>
+            <a:lvl3pPr algn="l" rtl="0" eaLnBrk="1" fontAlgn="base" hangingPunct="1">
+              <a:lnSpc>
+                <a:spcPct val="90000"/>
+              </a:lnSpc>
+              <a:spcBef>
+                <a:spcPct val="0"/>
+              </a:spcBef>
+              <a:spcAft>
+                <a:spcPct val="0"/>
+              </a:spcAft>
+              <a:defRPr sz="4400">
+                <a:solidFill>
+                  <a:schemeClr val="tx1"/>
+                </a:solidFill>
+                <a:latin typeface="Calibri Light" panose="020F0302020204030204" pitchFamily="34" charset="0"/>
+              </a:defRPr>
+            </a:lvl3pPr>
+            <a:lvl4pPr algn="l" rtl="0" eaLnBrk="1" fontAlgn="base" hangingPunct="1">
+              <a:lnSpc>
+                <a:spcPct val="90000"/>
+              </a:lnSpc>
+              <a:spcBef>
+                <a:spcPct val="0"/>
+              </a:spcBef>
+              <a:spcAft>
+                <a:spcPct val="0"/>
+              </a:spcAft>
+              <a:defRPr sz="4400">
+                <a:solidFill>
+                  <a:schemeClr val="tx1"/>
+                </a:solidFill>
+                <a:latin typeface="Calibri Light" panose="020F0302020204030204" pitchFamily="34" charset="0"/>
+              </a:defRPr>
+            </a:lvl4pPr>
+            <a:lvl5pPr algn="l" rtl="0" eaLnBrk="1" fontAlgn="base" hangingPunct="1">
+              <a:lnSpc>
+                <a:spcPct val="90000"/>
+              </a:lnSpc>
+              <a:spcBef>
+                <a:spcPct val="0"/>
+              </a:spcBef>
+              <a:spcAft>
+                <a:spcPct val="0"/>
+              </a:spcAft>
+              <a:defRPr sz="4400">
+                <a:solidFill>
+                  <a:schemeClr val="tx1"/>
+                </a:solidFill>
+                <a:latin typeface="Calibri Light" panose="020F0302020204030204" pitchFamily="34" charset="0"/>
+              </a:defRPr>
+            </a:lvl5pPr>
+            <a:lvl6pPr marL="457200" algn="l" rtl="0" eaLnBrk="1" fontAlgn="base" hangingPunct="1">
+              <a:lnSpc>
+                <a:spcPct val="90000"/>
+              </a:lnSpc>
+              <a:spcBef>
+                <a:spcPct val="0"/>
+              </a:spcBef>
+              <a:spcAft>
+                <a:spcPct val="0"/>
+              </a:spcAft>
+              <a:defRPr sz="4400">
+                <a:solidFill>
+                  <a:schemeClr val="tx1"/>
+                </a:solidFill>
+                <a:latin typeface="Calibri Light" panose="020F0302020204030204" pitchFamily="34" charset="0"/>
+              </a:defRPr>
+            </a:lvl6pPr>
+            <a:lvl7pPr marL="914400" algn="l" rtl="0" eaLnBrk="1" fontAlgn="base" hangingPunct="1">
+              <a:lnSpc>
+                <a:spcPct val="90000"/>
+              </a:lnSpc>
+              <a:spcBef>
+                <a:spcPct val="0"/>
+              </a:spcBef>
+              <a:spcAft>
+                <a:spcPct val="0"/>
+              </a:spcAft>
+              <a:defRPr sz="4400">
+                <a:solidFill>
+                  <a:schemeClr val="tx1"/>
+                </a:solidFill>
+                <a:latin typeface="Calibri Light" panose="020F0302020204030204" pitchFamily="34" charset="0"/>
+              </a:defRPr>
+            </a:lvl7pPr>
+            <a:lvl8pPr marL="1371600" algn="l" rtl="0" eaLnBrk="1" fontAlgn="base" hangingPunct="1">
+              <a:lnSpc>
+                <a:spcPct val="90000"/>
+              </a:lnSpc>
+              <a:spcBef>
+                <a:spcPct val="0"/>
+              </a:spcBef>
+              <a:spcAft>
+                <a:spcPct val="0"/>
+              </a:spcAft>
+              <a:defRPr sz="4400">
+                <a:solidFill>
+                  <a:schemeClr val="tx1"/>
+                </a:solidFill>
+                <a:latin typeface="Calibri Light" panose="020F0302020204030204" pitchFamily="34" charset="0"/>
+              </a:defRPr>
+            </a:lvl8pPr>
+            <a:lvl9pPr marL="1828800" algn="l" rtl="0" eaLnBrk="1" fontAlgn="base" hangingPunct="1">
+              <a:lnSpc>
+                <a:spcPct val="90000"/>
+              </a:lnSpc>
+              <a:spcBef>
+                <a:spcPct val="0"/>
+              </a:spcBef>
+              <a:spcAft>
+                <a:spcPct val="0"/>
+              </a:spcAft>
+              <a:defRPr sz="4400">
+                <a:solidFill>
+                  <a:schemeClr val="tx1"/>
+                </a:solidFill>
+                <a:latin typeface="Calibri Light" panose="020F0302020204030204" pitchFamily="34" charset="0"/>
+              </a:defRPr>
+            </a:lvl9pPr>
+          </a:lstStyle>
+          <a:p>
+            <a:pPr marL="0" marR="0" lvl="0" indent="0" algn="l" defTabSz="914400" rtl="0" eaLnBrk="1" fontAlgn="base" latinLnBrk="0" hangingPunct="1">
+              <a:lnSpc>
+                <a:spcPct val="90000"/>
+              </a:lnSpc>
+              <a:spcBef>
+                <a:spcPct val="0"/>
+              </a:spcBef>
+              <a:spcAft>
+                <a:spcPct val="0"/>
+              </a:spcAft>
+              <a:buClrTx/>
+              <a:buSzTx/>
+              <a:buFontTx/>
+              <a:buNone/>
+              <a:tabLst/>
+              <a:defRPr/>
+            </a:pPr>
+            <a:r>
+              <a:rPr kumimoji="0" lang="en-US" sz="6000" b="1" i="0" u="none" strike="noStrike" kern="1200" cap="none" spc="0" normalizeH="0" baseline="0" noProof="0">
+                <a:ln>
+                  <a:noFill/>
+                </a:ln>
+                <a:solidFill>
+                  <a:srgbClr val="F2F2F2"/>
+                </a:solidFill>
+                <a:effectLst/>
+                <a:uLnTx/>
+                <a:uFillTx/>
+                <a:latin typeface="IBM Plex Sans" panose="020B0503050203000203" pitchFamily="34" charset="77"/>
+                <a:ea typeface="+mj-ea"/>
+              </a:rPr>
+              <a:t>Jared</a:t>
+            </a:r>
+            <a:endParaRPr kumimoji="0" lang="en-US" sz="6000" b="1" i="0" u="none" strike="noStrike" kern="1200" cap="none" spc="0" normalizeH="0" baseline="0" noProof="0" dirty="0">
+              <a:ln>
+                <a:noFill/>
+              </a:ln>
+              <a:solidFill>
+                <a:srgbClr val="F2F2F2"/>
+              </a:solidFill>
+              <a:effectLst/>
+              <a:uLnTx/>
+              <a:uFillTx/>
+              <a:latin typeface="IBM Plex Sans" panose="020B0503050203000203" pitchFamily="34" charset="77"/>
+              <a:ea typeface="+mj-ea"/>
+            </a:endParaRPr>
+          </a:p>
+        </p:txBody>
+      </p:sp>
+      <p:sp>
+        <p:nvSpPr>
+          <p:cNvPr id="22" name="Text Placeholder 10">
+            <a:extLst>
+              <a:ext uri="{FF2B5EF4-FFF2-40B4-BE49-F238E27FC236}">
+                <a16:creationId xmlns:a16="http://schemas.microsoft.com/office/drawing/2014/main" id="{98EEE692-C70D-C440-66B5-C97B7F7F39AC}"/>
+              </a:ext>
+            </a:extLst>
+          </p:cNvPr>
+          <p:cNvSpPr txBox="1">
+            <a:spLocks/>
+          </p:cNvSpPr>
+          <p:nvPr/>
+        </p:nvSpPr>
+        <p:spPr bwMode="auto">
+          <a:xfrm>
+            <a:off x="424541" y="1168024"/>
+            <a:ext cx="6137624" cy="711882"/>
+          </a:xfrm>
+          <a:prstGeom prst="rect">
+            <a:avLst/>
+          </a:prstGeom>
+          <a:noFill/>
+          <a:ln>
+            <a:noFill/>
+          </a:ln>
+          <a:extLst>
+            <a:ext uri="{909E8E84-426E-40dd-AFC4-6F175D3DCCD1}">
+              <a14:hiddenFill xmlns="" xmlns:a14="http://schemas.microsoft.com/office/drawing/2010/main">
+                <a:solidFill>
+                  <a:srgbClr val="FFFFFF"/>
+                </a:solidFill>
+              </a14:hiddenFill>
+            </a:ext>
+            <a:ext uri="{91240B29-F687-4f45-9708-019B960494DF}">
+              <a14:hiddenLine xmlns="" xmlns:a14="http://schemas.microsoft.com/office/drawing/2010/main" w="9525">
+                <a:solidFill>
+                  <a:srgbClr val="000000"/>
+                </a:solidFill>
+                <a:miter lim="800000"/>
+                <a:headEnd/>
+                <a:tailEnd/>
+              </a14:hiddenLine>
+            </a:ext>
+          </a:extLst>
+        </p:spPr>
+        <p:txBody>
+          <a:bodyPr vert="horz" wrap="square" lIns="91440" tIns="45720" rIns="91440" bIns="45720" numCol="1" anchor="t" anchorCtr="0" compatLnSpc="1">
+            <a:prstTxWarp prst="textNoShape">
+              <a:avLst/>
+            </a:prstTxWarp>
+            <a:noAutofit/>
+          </a:bodyPr>
+          <a:lstStyle>
+            <a:lvl1pPr marL="0" indent="0" algn="l" rtl="0" eaLnBrk="1" fontAlgn="base" hangingPunct="1">
+              <a:lnSpc>
+                <a:spcPct val="90000"/>
+              </a:lnSpc>
+              <a:spcBef>
+                <a:spcPts val="1000"/>
+              </a:spcBef>
+              <a:spcAft>
+                <a:spcPct val="0"/>
+              </a:spcAft>
+              <a:buClr>
+                <a:srgbClr val="CC0000"/>
+              </a:buClr>
+              <a:buSzPct val="100000"/>
+              <a:buFont typeface="Arial"/>
+              <a:buNone/>
+              <a:defRPr sz="6000" b="1" i="0" kern="1200">
+                <a:solidFill>
+                  <a:srgbClr val="F2F2F2"/>
+                </a:solidFill>
+                <a:latin typeface="IBM Plex Sans" panose="020B0503050203000203" pitchFamily="34" charset="77"/>
+                <a:ea typeface="+mn-ea"/>
+                <a:cs typeface="IBM Plex Sans" panose="020B0503050203000203" pitchFamily="34" charset="77"/>
+              </a:defRPr>
+            </a:lvl1pPr>
+            <a:lvl2pPr marL="914400" indent="-457200" algn="l" rtl="0" eaLnBrk="1" fontAlgn="base" hangingPunct="1">
+              <a:lnSpc>
+                <a:spcPct val="130000"/>
+              </a:lnSpc>
+              <a:spcBef>
+                <a:spcPts val="500"/>
+              </a:spcBef>
+              <a:spcAft>
+                <a:spcPct val="0"/>
+              </a:spcAft>
+              <a:buClr>
+                <a:srgbClr val="CC0000"/>
+              </a:buClr>
+              <a:buSzPct val="100000"/>
+              <a:buFont typeface="Arial"/>
+              <a:buChar char="•"/>
+              <a:defRPr sz="2800" b="0" i="0" kern="1200">
+                <a:solidFill>
+                  <a:schemeClr val="tx1"/>
+                </a:solidFill>
+                <a:latin typeface="IBM Plex Sans" panose="020B0503050203000203" pitchFamily="34" charset="77"/>
+                <a:ea typeface="+mn-ea"/>
+                <a:cs typeface="IBM Plex Sans" panose="020B0503050203000203" pitchFamily="34" charset="77"/>
+              </a:defRPr>
+            </a:lvl2pPr>
+            <a:lvl3pPr marL="1257300" indent="-342900" algn="l" rtl="0" eaLnBrk="1" fontAlgn="base" hangingPunct="1">
+              <a:lnSpc>
+                <a:spcPct val="130000"/>
+              </a:lnSpc>
+              <a:spcBef>
+                <a:spcPts val="500"/>
+              </a:spcBef>
+              <a:spcAft>
+                <a:spcPct val="0"/>
+              </a:spcAft>
+              <a:buClr>
+                <a:srgbClr val="CC0000"/>
+              </a:buClr>
+              <a:buSzPct val="100000"/>
+              <a:buFont typeface="Arial"/>
+              <a:buChar char="•"/>
+              <a:defRPr sz="2400" b="0" i="0" kern="1200">
+                <a:solidFill>
+                  <a:schemeClr val="tx1"/>
+                </a:solidFill>
+                <a:latin typeface="IBM Plex Sans" panose="020B0503050203000203" pitchFamily="34" charset="77"/>
+                <a:ea typeface="+mn-ea"/>
+                <a:cs typeface="IBM Plex Sans" panose="020B0503050203000203" pitchFamily="34" charset="77"/>
+              </a:defRPr>
+            </a:lvl3pPr>
+            <a:lvl4pPr marL="1600200" indent="-228600" algn="l" rtl="0" eaLnBrk="1" fontAlgn="base" hangingPunct="1">
+              <a:lnSpc>
+                <a:spcPct val="120000"/>
+              </a:lnSpc>
+              <a:spcBef>
+                <a:spcPts val="500"/>
+              </a:spcBef>
+              <a:spcAft>
+                <a:spcPct val="0"/>
+              </a:spcAft>
+              <a:buFont typeface="Arial" panose="020B0604020202020204" pitchFamily="34" charset="0"/>
+              <a:buChar char="•"/>
+              <a:defRPr b="0" i="0" kern="1200">
+                <a:solidFill>
+                  <a:srgbClr val="191919"/>
+                </a:solidFill>
+                <a:latin typeface="Roboto Regular"/>
+                <a:ea typeface="+mn-ea"/>
+                <a:cs typeface="Roboto Regular"/>
+              </a:defRPr>
+            </a:lvl4pPr>
+            <a:lvl5pPr marL="2057400" indent="-228600" algn="l" rtl="0" eaLnBrk="1" fontAlgn="base" hangingPunct="1">
+              <a:lnSpc>
+                <a:spcPct val="120000"/>
+              </a:lnSpc>
+              <a:spcBef>
+                <a:spcPts val="500"/>
+              </a:spcBef>
+              <a:spcAft>
+                <a:spcPct val="0"/>
+              </a:spcAft>
+              <a:buFont typeface="Arial" panose="020B0604020202020204" pitchFamily="34" charset="0"/>
+              <a:buChar char="•"/>
+              <a:defRPr b="0" i="0" kern="1200">
+                <a:solidFill>
+                  <a:srgbClr val="191919"/>
+                </a:solidFill>
+                <a:latin typeface="Roboto Regular"/>
+                <a:ea typeface="+mn-ea"/>
+                <a:cs typeface="Roboto Regular"/>
+              </a:defRPr>
+            </a:lvl5pPr>
+            <a:lvl6pPr marL="2514600" indent="-228600" algn="l" defTabSz="914400" rtl="0" eaLnBrk="1" latinLnBrk="0" hangingPunct="1">
+              <a:lnSpc>
+                <a:spcPct val="90000"/>
+              </a:lnSpc>
+              <a:spcBef>
+                <a:spcPts val="500"/>
+              </a:spcBef>
+              <a:buFont typeface="Arial" panose="020B0604020202020204" pitchFamily="34" charset="0"/>
+              <a:buChar char="•"/>
+              <a:defRPr sz="1800" kern="1200">
+                <a:solidFill>
+                  <a:schemeClr val="tx1"/>
+                </a:solidFill>
+                <a:latin typeface="+mn-lt"/>
+                <a:ea typeface="+mn-ea"/>
+                <a:cs typeface="+mn-cs"/>
+              </a:defRPr>
+            </a:lvl6pPr>
+            <a:lvl7pPr marL="2971800" indent="-228600" algn="l" defTabSz="914400" rtl="0" eaLnBrk="1" latinLnBrk="0" hangingPunct="1">
+              <a:lnSpc>
+                <a:spcPct val="90000"/>
+              </a:lnSpc>
+              <a:spcBef>
+                <a:spcPts val="500"/>
+              </a:spcBef>
+              <a:buFont typeface="Arial" panose="020B0604020202020204" pitchFamily="34" charset="0"/>
+              <a:buChar char="•"/>
+              <a:defRPr sz="1800" kern="1200">
+                <a:solidFill>
+                  <a:schemeClr val="tx1"/>
+                </a:solidFill>
+                <a:latin typeface="+mn-lt"/>
+                <a:ea typeface="+mn-ea"/>
+                <a:cs typeface="+mn-cs"/>
+              </a:defRPr>
+            </a:lvl7pPr>
+            <a:lvl8pPr marL="3429000" indent="-228600" algn="l" defTabSz="914400" rtl="0" eaLnBrk="1" latinLnBrk="0" hangingPunct="1">
+              <a:lnSpc>
+                <a:spcPct val="90000"/>
+              </a:lnSpc>
+              <a:spcBef>
+                <a:spcPts val="500"/>
+              </a:spcBef>
+              <a:buFont typeface="Arial" panose="020B0604020202020204" pitchFamily="34" charset="0"/>
+              <a:buChar char="•"/>
+              <a:defRPr sz="1800" kern="1200">
+                <a:solidFill>
+                  <a:schemeClr val="tx1"/>
+                </a:solidFill>
+                <a:latin typeface="+mn-lt"/>
+                <a:ea typeface="+mn-ea"/>
+                <a:cs typeface="+mn-cs"/>
+              </a:defRPr>
+            </a:lvl8pPr>
+            <a:lvl9pPr marL="3886200" indent="-228600" algn="l" defTabSz="914400" rtl="0" eaLnBrk="1" latinLnBrk="0" hangingPunct="1">
+              <a:lnSpc>
+                <a:spcPct val="90000"/>
+              </a:lnSpc>
+              <a:spcBef>
+                <a:spcPts val="500"/>
+              </a:spcBef>
+              <a:buFont typeface="Arial" panose="020B0604020202020204" pitchFamily="34" charset="0"/>
+              <a:buChar char="•"/>
+              <a:defRPr sz="1800" kern="1200">
+                <a:solidFill>
+                  <a:schemeClr val="tx1"/>
+                </a:solidFill>
+                <a:latin typeface="+mn-lt"/>
+                <a:ea typeface="+mn-ea"/>
+                <a:cs typeface="+mn-cs"/>
+              </a:defRPr>
+            </a:lvl9pPr>
+          </a:lstStyle>
+          <a:p>
+            <a:pPr marL="0" marR="0" lvl="0" indent="0" algn="l" defTabSz="914400" rtl="0" eaLnBrk="1" fontAlgn="base" latinLnBrk="0" hangingPunct="1">
+              <a:lnSpc>
+                <a:spcPct val="90000"/>
+              </a:lnSpc>
+              <a:spcBef>
+                <a:spcPts val="1000"/>
+              </a:spcBef>
+              <a:spcAft>
+                <a:spcPct val="0"/>
+              </a:spcAft>
+              <a:buClr>
+                <a:srgbClr val="CC0000"/>
+              </a:buClr>
+              <a:buSzPct val="100000"/>
+              <a:buFont typeface="Arial"/>
+              <a:buNone/>
+              <a:tabLst/>
+              <a:defRPr/>
+            </a:pPr>
+            <a:r>
+              <a:rPr kumimoji="0" lang="en-US" sz="6000" b="1" i="0" u="none" strike="noStrike" kern="1200" cap="none" spc="0" normalizeH="0" baseline="0" noProof="0">
+                <a:ln>
+                  <a:noFill/>
+                </a:ln>
+                <a:solidFill>
+                  <a:srgbClr val="F2F2F2"/>
+                </a:solidFill>
+                <a:effectLst/>
+                <a:uLnTx/>
+                <a:uFillTx/>
+                <a:latin typeface="IBM Plex Sans" panose="020B0503050203000203" pitchFamily="34" charset="77"/>
+                <a:ea typeface="+mn-ea"/>
+              </a:rPr>
+              <a:t>Poche</a:t>
+            </a:r>
+            <a:endParaRPr kumimoji="0" lang="en-US" sz="6000" b="1" i="0" u="none" strike="noStrike" kern="1200" cap="none" spc="0" normalizeH="0" baseline="0" noProof="0" dirty="0">
+              <a:ln>
+                <a:noFill/>
+              </a:ln>
+              <a:solidFill>
+                <a:srgbClr val="F2F2F2"/>
+              </a:solidFill>
+              <a:effectLst/>
+              <a:uLnTx/>
+              <a:uFillTx/>
+              <a:latin typeface="IBM Plex Sans" panose="020B0503050203000203" pitchFamily="34" charset="77"/>
+              <a:ea typeface="+mn-ea"/>
+            </a:endParaRPr>
+          </a:p>
+        </p:txBody>
+      </p:sp>
+      <p:sp>
+        <p:nvSpPr>
+          <p:cNvPr id="23" name="Content Placeholder 2">
+            <a:extLst>
+              <a:ext uri="{FF2B5EF4-FFF2-40B4-BE49-F238E27FC236}">
+                <a16:creationId xmlns:a16="http://schemas.microsoft.com/office/drawing/2014/main" id="{AAAE8F96-6641-13A5-ED04-BAF1B28FDF00}"/>
+              </a:ext>
+            </a:extLst>
+          </p:cNvPr>
+          <p:cNvSpPr txBox="1">
+            <a:spLocks/>
+          </p:cNvSpPr>
+          <p:nvPr/>
+        </p:nvSpPr>
+        <p:spPr bwMode="auto">
+          <a:xfrm>
+            <a:off x="424542" y="2560817"/>
+            <a:ext cx="6035252" cy="647786"/>
+          </a:xfrm>
+          <a:prstGeom prst="rect">
+            <a:avLst/>
+          </a:prstGeom>
+          <a:noFill/>
+          <a:ln>
+            <a:noFill/>
+          </a:ln>
+          <a:extLst>
+            <a:ext uri="{909E8E84-426E-40dd-AFC4-6F175D3DCCD1}">
+              <a14:hiddenFill xmlns="" xmlns:a14="http://schemas.microsoft.com/office/drawing/2010/main">
+                <a:solidFill>
+                  <a:srgbClr val="FFFFFF"/>
+                </a:solidFill>
+              </a14:hiddenFill>
+            </a:ext>
+            <a:ext uri="{91240B29-F687-4f45-9708-019B960494DF}">
+              <a14:hiddenLine xmlns="" xmlns:a14="http://schemas.microsoft.com/office/drawing/2010/main" w="9525">
+                <a:solidFill>
+                  <a:srgbClr val="000000"/>
+                </a:solidFill>
+                <a:miter lim="800000"/>
+                <a:headEnd/>
+                <a:tailEnd/>
+              </a14:hiddenLine>
+            </a:ext>
+          </a:extLst>
+        </p:spPr>
+        <p:txBody>
+          <a:bodyPr vert="horz" wrap="square" lIns="91440" tIns="45720" rIns="91440" bIns="45720" numCol="1" anchor="t" anchorCtr="0" compatLnSpc="1">
+            <a:prstTxWarp prst="textNoShape">
+              <a:avLst/>
+            </a:prstTxWarp>
+            <a:noAutofit/>
+          </a:bodyPr>
+          <a:lstStyle>
+            <a:lvl1pPr marL="0" indent="0" algn="l" rtl="0" eaLnBrk="1" fontAlgn="base" hangingPunct="1">
+              <a:lnSpc>
+                <a:spcPct val="100000"/>
+              </a:lnSpc>
+              <a:spcBef>
+                <a:spcPts val="1000"/>
+              </a:spcBef>
+              <a:spcAft>
+                <a:spcPct val="0"/>
+              </a:spcAft>
+              <a:buClr>
+                <a:srgbClr val="CC0000"/>
+              </a:buClr>
+              <a:buSzPct val="100000"/>
+              <a:buFont typeface="Arial"/>
+              <a:buNone/>
+              <a:defRPr sz="3600" b="1" i="0" kern="1200">
+                <a:solidFill>
+                  <a:srgbClr val="F2F2F2"/>
+                </a:solidFill>
+                <a:latin typeface="IBM Plex Sans SemiBold" panose="020B0503050203000203" pitchFamily="34" charset="77"/>
+                <a:ea typeface="+mn-ea"/>
+                <a:cs typeface="IBM Plex Sans" panose="020B0503050203000203" pitchFamily="34" charset="77"/>
+              </a:defRPr>
+            </a:lvl1pPr>
+            <a:lvl2pPr marL="914400" indent="-457200" algn="l" rtl="0" eaLnBrk="1" fontAlgn="base" hangingPunct="1">
+              <a:lnSpc>
+                <a:spcPct val="130000"/>
+              </a:lnSpc>
+              <a:spcBef>
+                <a:spcPts val="500"/>
+              </a:spcBef>
+              <a:spcAft>
+                <a:spcPct val="0"/>
+              </a:spcAft>
+              <a:buClr>
+                <a:srgbClr val="CC0000"/>
+              </a:buClr>
+              <a:buSzPct val="100000"/>
+              <a:buFont typeface="Arial"/>
+              <a:buChar char="•"/>
+              <a:defRPr sz="2800" b="0" i="0" kern="1200">
+                <a:solidFill>
+                  <a:schemeClr val="tx1"/>
+                </a:solidFill>
+                <a:latin typeface="IBM Plex Sans" panose="020B0503050203000203" pitchFamily="34" charset="77"/>
+                <a:ea typeface="+mn-ea"/>
+                <a:cs typeface="IBM Plex Sans" panose="020B0503050203000203" pitchFamily="34" charset="77"/>
+              </a:defRPr>
+            </a:lvl2pPr>
+            <a:lvl3pPr marL="1257300" indent="-342900" algn="l" rtl="0" eaLnBrk="1" fontAlgn="base" hangingPunct="1">
+              <a:lnSpc>
+                <a:spcPct val="130000"/>
+              </a:lnSpc>
+              <a:spcBef>
+                <a:spcPts val="500"/>
+              </a:spcBef>
+              <a:spcAft>
+                <a:spcPct val="0"/>
+              </a:spcAft>
+              <a:buClr>
+                <a:srgbClr val="CC0000"/>
+              </a:buClr>
+              <a:buSzPct val="100000"/>
+              <a:buFont typeface="Arial"/>
+              <a:buChar char="•"/>
+              <a:defRPr sz="2400" b="0" i="0" kern="1200">
+                <a:solidFill>
+                  <a:schemeClr val="tx1"/>
+                </a:solidFill>
+                <a:latin typeface="IBM Plex Sans" panose="020B0503050203000203" pitchFamily="34" charset="77"/>
+                <a:ea typeface="+mn-ea"/>
+                <a:cs typeface="IBM Plex Sans" panose="020B0503050203000203" pitchFamily="34" charset="77"/>
+              </a:defRPr>
+            </a:lvl3pPr>
+            <a:lvl4pPr marL="1600200" indent="-228600" algn="l" rtl="0" eaLnBrk="1" fontAlgn="base" hangingPunct="1">
+              <a:lnSpc>
+                <a:spcPct val="120000"/>
+              </a:lnSpc>
+              <a:spcBef>
+                <a:spcPts val="500"/>
+              </a:spcBef>
+              <a:spcAft>
+                <a:spcPct val="0"/>
+              </a:spcAft>
+              <a:buFont typeface="Arial" panose="020B0604020202020204" pitchFamily="34" charset="0"/>
+              <a:buChar char="•"/>
+              <a:defRPr b="0" i="0" kern="1200">
+                <a:solidFill>
+                  <a:srgbClr val="191919"/>
+                </a:solidFill>
+                <a:latin typeface="Roboto Regular"/>
+                <a:ea typeface="+mn-ea"/>
+                <a:cs typeface="Roboto Regular"/>
+              </a:defRPr>
+            </a:lvl4pPr>
+            <a:lvl5pPr marL="2057400" indent="-228600" algn="l" rtl="0" eaLnBrk="1" fontAlgn="base" hangingPunct="1">
+              <a:lnSpc>
+                <a:spcPct val="120000"/>
+              </a:lnSpc>
+              <a:spcBef>
+                <a:spcPts val="500"/>
+              </a:spcBef>
+              <a:spcAft>
+                <a:spcPct val="0"/>
+              </a:spcAft>
+              <a:buFont typeface="Arial" panose="020B0604020202020204" pitchFamily="34" charset="0"/>
+              <a:buChar char="•"/>
+              <a:defRPr b="0" i="0" kern="1200">
+                <a:solidFill>
+                  <a:srgbClr val="191919"/>
+                </a:solidFill>
+                <a:latin typeface="Roboto Regular"/>
+                <a:ea typeface="+mn-ea"/>
+                <a:cs typeface="Roboto Regular"/>
+              </a:defRPr>
+            </a:lvl5pPr>
+            <a:lvl6pPr marL="2514600" indent="-228600" algn="l" defTabSz="914400" rtl="0" eaLnBrk="1" latinLnBrk="0" hangingPunct="1">
+              <a:lnSpc>
+                <a:spcPct val="90000"/>
+              </a:lnSpc>
+              <a:spcBef>
+                <a:spcPts val="500"/>
+              </a:spcBef>
+              <a:buFont typeface="Arial" panose="020B0604020202020204" pitchFamily="34" charset="0"/>
+              <a:buChar char="•"/>
+              <a:defRPr sz="1800" kern="1200">
+                <a:solidFill>
+                  <a:schemeClr val="tx1"/>
+                </a:solidFill>
+                <a:latin typeface="+mn-lt"/>
+                <a:ea typeface="+mn-ea"/>
+                <a:cs typeface="+mn-cs"/>
+              </a:defRPr>
+            </a:lvl6pPr>
+            <a:lvl7pPr marL="2971800" indent="-228600" algn="l" defTabSz="914400" rtl="0" eaLnBrk="1" latinLnBrk="0" hangingPunct="1">
+              <a:lnSpc>
+                <a:spcPct val="90000"/>
+              </a:lnSpc>
+              <a:spcBef>
+                <a:spcPts val="500"/>
+              </a:spcBef>
+              <a:buFont typeface="Arial" panose="020B0604020202020204" pitchFamily="34" charset="0"/>
+              <a:buChar char="•"/>
+              <a:defRPr sz="1800" kern="1200">
+                <a:solidFill>
+                  <a:schemeClr val="tx1"/>
+                </a:solidFill>
+                <a:latin typeface="+mn-lt"/>
+                <a:ea typeface="+mn-ea"/>
+                <a:cs typeface="+mn-cs"/>
+              </a:defRPr>
+            </a:lvl7pPr>
+            <a:lvl8pPr marL="3429000" indent="-228600" algn="l" defTabSz="914400" rtl="0" eaLnBrk="1" latinLnBrk="0" hangingPunct="1">
+              <a:lnSpc>
+                <a:spcPct val="90000"/>
+              </a:lnSpc>
+              <a:spcBef>
+                <a:spcPts val="500"/>
+              </a:spcBef>
+              <a:buFont typeface="Arial" panose="020B0604020202020204" pitchFamily="34" charset="0"/>
+              <a:buChar char="•"/>
+              <a:defRPr sz="1800" kern="1200">
+                <a:solidFill>
+                  <a:schemeClr val="tx1"/>
+                </a:solidFill>
+                <a:latin typeface="+mn-lt"/>
+                <a:ea typeface="+mn-ea"/>
+                <a:cs typeface="+mn-cs"/>
+              </a:defRPr>
+            </a:lvl8pPr>
+            <a:lvl9pPr marL="3886200" indent="-228600" algn="l" defTabSz="914400" rtl="0" eaLnBrk="1" latinLnBrk="0" hangingPunct="1">
+              <a:lnSpc>
+                <a:spcPct val="90000"/>
+              </a:lnSpc>
+              <a:spcBef>
+                <a:spcPts val="500"/>
+              </a:spcBef>
+              <a:buFont typeface="Arial" panose="020B0604020202020204" pitchFamily="34" charset="0"/>
+              <a:buChar char="•"/>
+              <a:defRPr sz="1800" kern="1200">
+                <a:solidFill>
+                  <a:schemeClr val="tx1"/>
+                </a:solidFill>
+                <a:latin typeface="+mn-lt"/>
+                <a:ea typeface="+mn-ea"/>
+                <a:cs typeface="+mn-cs"/>
+              </a:defRPr>
+            </a:lvl9pPr>
+          </a:lstStyle>
+          <a:p>
+            <a:pPr marL="0" marR="0" lvl="0" indent="0" algn="l" defTabSz="914400" rtl="0" eaLnBrk="1" fontAlgn="base" latinLnBrk="0" hangingPunct="1">
+              <a:lnSpc>
+                <a:spcPct val="100000"/>
+              </a:lnSpc>
+              <a:spcBef>
+                <a:spcPts val="1000"/>
+              </a:spcBef>
+              <a:spcAft>
+                <a:spcPct val="0"/>
+              </a:spcAft>
+              <a:buClr>
+                <a:srgbClr val="CC0000"/>
+              </a:buClr>
+              <a:buSzPct val="100000"/>
+              <a:buFont typeface="Arial"/>
+              <a:buNone/>
+              <a:tabLst/>
+              <a:defRPr/>
+            </a:pPr>
+            <a:r>
+              <a:rPr kumimoji="0" lang="en-US" sz="3600" b="1" i="0" u="none" strike="noStrike" kern="1200" cap="none" spc="0" normalizeH="0" baseline="0" noProof="0" dirty="0">
+                <a:ln>
+                  <a:noFill/>
+                </a:ln>
+                <a:solidFill>
+                  <a:srgbClr val="F2F2F2"/>
+                </a:solidFill>
+                <a:effectLst/>
+                <a:uLnTx/>
+                <a:uFillTx/>
+                <a:latin typeface="IBM Plex Sans SemiBold" panose="020B0503050203000203" pitchFamily="34" charset="77"/>
+                <a:ea typeface="+mn-ea"/>
+              </a:rPr>
+              <a:t>Database Architect</a:t>
+            </a:r>
+          </a:p>
+        </p:txBody>
+      </p:sp>
+      <p:sp>
+        <p:nvSpPr>
+          <p:cNvPr id="25" name="Content Placeholder 7">
+            <a:extLst>
+              <a:ext uri="{FF2B5EF4-FFF2-40B4-BE49-F238E27FC236}">
+                <a16:creationId xmlns:a16="http://schemas.microsoft.com/office/drawing/2014/main" id="{E999573A-26E3-1A94-7AB8-CD51C8D0338B}"/>
+              </a:ext>
+            </a:extLst>
+          </p:cNvPr>
+          <p:cNvSpPr txBox="1">
+            <a:spLocks/>
+          </p:cNvSpPr>
+          <p:nvPr/>
+        </p:nvSpPr>
+        <p:spPr bwMode="auto">
+          <a:xfrm>
+            <a:off x="424542" y="3219579"/>
+            <a:ext cx="6035252" cy="647786"/>
+          </a:xfrm>
+          <a:prstGeom prst="rect">
+            <a:avLst/>
+          </a:prstGeom>
+          <a:noFill/>
+          <a:ln>
+            <a:noFill/>
+          </a:ln>
+          <a:extLst>
+            <a:ext uri="{909E8E84-426E-40dd-AFC4-6F175D3DCCD1}">
+              <a14:hiddenFill xmlns="" xmlns:a14="http://schemas.microsoft.com/office/drawing/2010/main">
+                <a:solidFill>
+                  <a:srgbClr val="FFFFFF"/>
+                </a:solidFill>
+              </a14:hiddenFill>
+            </a:ext>
+            <a:ext uri="{91240B29-F687-4f45-9708-019B960494DF}">
+              <a14:hiddenLine xmlns="" xmlns:a14="http://schemas.microsoft.com/office/drawing/2010/main" w="9525">
+                <a:solidFill>
+                  <a:srgbClr val="000000"/>
+                </a:solidFill>
+                <a:miter lim="800000"/>
+                <a:headEnd/>
+                <a:tailEnd/>
+              </a14:hiddenLine>
+            </a:ext>
+          </a:extLst>
+        </p:spPr>
+        <p:txBody>
+          <a:bodyPr vert="horz" wrap="square" lIns="91440" tIns="45720" rIns="91440" bIns="45720" numCol="1" anchor="t" anchorCtr="0" compatLnSpc="1">
+            <a:prstTxWarp prst="textNoShape">
+              <a:avLst/>
+            </a:prstTxWarp>
+            <a:normAutofit/>
+          </a:bodyPr>
+          <a:lstStyle>
+            <a:lvl1pPr marL="0" indent="0" algn="l" rtl="0" eaLnBrk="1" fontAlgn="base" hangingPunct="1">
+              <a:lnSpc>
+                <a:spcPct val="100000"/>
+              </a:lnSpc>
+              <a:spcBef>
+                <a:spcPts val="1000"/>
+              </a:spcBef>
+              <a:spcAft>
+                <a:spcPct val="0"/>
+              </a:spcAft>
+              <a:buClr>
+                <a:srgbClr val="CC0000"/>
+              </a:buClr>
+              <a:buSzPct val="100000"/>
+              <a:buFont typeface="Arial"/>
+              <a:buNone/>
+              <a:defRPr sz="3600" b="0" i="0" kern="1200">
+                <a:solidFill>
+                  <a:srgbClr val="F2F2F2"/>
+                </a:solidFill>
+                <a:latin typeface="IBM Plex Sans" panose="020B0503050203000203" pitchFamily="34" charset="77"/>
+                <a:ea typeface="+mn-ea"/>
+                <a:cs typeface="IBM Plex Sans" panose="020B0503050203000203" pitchFamily="34" charset="77"/>
+              </a:defRPr>
+            </a:lvl1pPr>
+            <a:lvl2pPr marL="914400" indent="-457200" algn="l" rtl="0" eaLnBrk="1" fontAlgn="base" hangingPunct="1">
+              <a:lnSpc>
+                <a:spcPct val="130000"/>
+              </a:lnSpc>
+              <a:spcBef>
+                <a:spcPts val="500"/>
+              </a:spcBef>
+              <a:spcAft>
+                <a:spcPct val="0"/>
+              </a:spcAft>
+              <a:buClr>
+                <a:srgbClr val="CC0000"/>
+              </a:buClr>
+              <a:buSzPct val="100000"/>
+              <a:buFont typeface="Arial"/>
+              <a:buChar char="•"/>
+              <a:defRPr sz="2800" b="0" i="0" kern="1200">
+                <a:solidFill>
+                  <a:schemeClr val="tx1"/>
+                </a:solidFill>
+                <a:latin typeface="IBM Plex Sans" panose="020B0503050203000203" pitchFamily="34" charset="77"/>
+                <a:ea typeface="+mn-ea"/>
+                <a:cs typeface="IBM Plex Sans" panose="020B0503050203000203" pitchFamily="34" charset="77"/>
+              </a:defRPr>
+            </a:lvl2pPr>
+            <a:lvl3pPr marL="1257300" indent="-342900" algn="l" rtl="0" eaLnBrk="1" fontAlgn="base" hangingPunct="1">
+              <a:lnSpc>
+                <a:spcPct val="130000"/>
+              </a:lnSpc>
+              <a:spcBef>
+                <a:spcPts val="500"/>
+              </a:spcBef>
+              <a:spcAft>
+                <a:spcPct val="0"/>
+              </a:spcAft>
+              <a:buClr>
+                <a:srgbClr val="CC0000"/>
+              </a:buClr>
+              <a:buSzPct val="100000"/>
+              <a:buFont typeface="Arial"/>
+              <a:buChar char="•"/>
+              <a:defRPr sz="2400" b="0" i="0" kern="1200">
+                <a:solidFill>
+                  <a:schemeClr val="tx1"/>
+                </a:solidFill>
+                <a:latin typeface="IBM Plex Sans" panose="020B0503050203000203" pitchFamily="34" charset="77"/>
+                <a:ea typeface="+mn-ea"/>
+                <a:cs typeface="IBM Plex Sans" panose="020B0503050203000203" pitchFamily="34" charset="77"/>
+              </a:defRPr>
+            </a:lvl3pPr>
+            <a:lvl4pPr marL="1600200" indent="-228600" algn="l" rtl="0" eaLnBrk="1" fontAlgn="base" hangingPunct="1">
+              <a:lnSpc>
+                <a:spcPct val="120000"/>
+              </a:lnSpc>
+              <a:spcBef>
+                <a:spcPts val="500"/>
+              </a:spcBef>
+              <a:spcAft>
+                <a:spcPct val="0"/>
+              </a:spcAft>
+              <a:buFont typeface="Arial" panose="020B0604020202020204" pitchFamily="34" charset="0"/>
+              <a:buChar char="•"/>
+              <a:defRPr b="0" i="0" kern="1200">
+                <a:solidFill>
+                  <a:srgbClr val="191919"/>
+                </a:solidFill>
+                <a:latin typeface="Roboto Regular"/>
+                <a:ea typeface="+mn-ea"/>
+                <a:cs typeface="Roboto Regular"/>
+              </a:defRPr>
+            </a:lvl4pPr>
+            <a:lvl5pPr marL="2057400" indent="-228600" algn="l" rtl="0" eaLnBrk="1" fontAlgn="base" hangingPunct="1">
+              <a:lnSpc>
+                <a:spcPct val="120000"/>
+              </a:lnSpc>
+              <a:spcBef>
+                <a:spcPts val="500"/>
+              </a:spcBef>
+              <a:spcAft>
+                <a:spcPct val="0"/>
+              </a:spcAft>
+              <a:buFont typeface="Arial" panose="020B0604020202020204" pitchFamily="34" charset="0"/>
+              <a:buChar char="•"/>
+              <a:defRPr b="0" i="0" kern="1200">
+                <a:solidFill>
+                  <a:srgbClr val="191919"/>
+                </a:solidFill>
+                <a:latin typeface="Roboto Regular"/>
+                <a:ea typeface="+mn-ea"/>
+                <a:cs typeface="Roboto Regular"/>
+              </a:defRPr>
+            </a:lvl5pPr>
+            <a:lvl6pPr marL="2514600" indent="-228600" algn="l" defTabSz="914400" rtl="0" eaLnBrk="1" latinLnBrk="0" hangingPunct="1">
+              <a:lnSpc>
+                <a:spcPct val="90000"/>
+              </a:lnSpc>
+              <a:spcBef>
+                <a:spcPts val="500"/>
+              </a:spcBef>
+              <a:buFont typeface="Arial" panose="020B0604020202020204" pitchFamily="34" charset="0"/>
+              <a:buChar char="•"/>
+              <a:defRPr sz="1800" kern="1200">
+                <a:solidFill>
+                  <a:schemeClr val="tx1"/>
+                </a:solidFill>
+                <a:latin typeface="+mn-lt"/>
+                <a:ea typeface="+mn-ea"/>
+                <a:cs typeface="+mn-cs"/>
+              </a:defRPr>
+            </a:lvl6pPr>
+            <a:lvl7pPr marL="2971800" indent="-228600" algn="l" defTabSz="914400" rtl="0" eaLnBrk="1" latinLnBrk="0" hangingPunct="1">
+              <a:lnSpc>
+                <a:spcPct val="90000"/>
+              </a:lnSpc>
+              <a:spcBef>
+                <a:spcPts val="500"/>
+              </a:spcBef>
+              <a:buFont typeface="Arial" panose="020B0604020202020204" pitchFamily="34" charset="0"/>
+              <a:buChar char="•"/>
+              <a:defRPr sz="1800" kern="1200">
+                <a:solidFill>
+                  <a:schemeClr val="tx1"/>
+                </a:solidFill>
+                <a:latin typeface="+mn-lt"/>
+                <a:ea typeface="+mn-ea"/>
+                <a:cs typeface="+mn-cs"/>
+              </a:defRPr>
+            </a:lvl7pPr>
+            <a:lvl8pPr marL="3429000" indent="-228600" algn="l" defTabSz="914400" rtl="0" eaLnBrk="1" latinLnBrk="0" hangingPunct="1">
+              <a:lnSpc>
+                <a:spcPct val="90000"/>
+              </a:lnSpc>
+              <a:spcBef>
+                <a:spcPts val="500"/>
+              </a:spcBef>
+              <a:buFont typeface="Arial" panose="020B0604020202020204" pitchFamily="34" charset="0"/>
+              <a:buChar char="•"/>
+              <a:defRPr sz="1800" kern="1200">
+                <a:solidFill>
+                  <a:schemeClr val="tx1"/>
+                </a:solidFill>
+                <a:latin typeface="+mn-lt"/>
+                <a:ea typeface="+mn-ea"/>
+                <a:cs typeface="+mn-cs"/>
+              </a:defRPr>
+            </a:lvl8pPr>
+            <a:lvl9pPr marL="3886200" indent="-228600" algn="l" defTabSz="914400" rtl="0" eaLnBrk="1" latinLnBrk="0" hangingPunct="1">
+              <a:lnSpc>
+                <a:spcPct val="90000"/>
+              </a:lnSpc>
+              <a:spcBef>
+                <a:spcPts val="500"/>
+              </a:spcBef>
+              <a:buFont typeface="Arial" panose="020B0604020202020204" pitchFamily="34" charset="0"/>
+              <a:buChar char="•"/>
+              <a:defRPr sz="1800" kern="1200">
+                <a:solidFill>
+                  <a:schemeClr val="tx1"/>
+                </a:solidFill>
+                <a:latin typeface="+mn-lt"/>
+                <a:ea typeface="+mn-ea"/>
+                <a:cs typeface="+mn-cs"/>
+              </a:defRPr>
+            </a:lvl9pPr>
+          </a:lstStyle>
+          <a:p>
+            <a:pPr marL="0" marR="0" lvl="0" indent="0" algn="l" defTabSz="914400" rtl="0" eaLnBrk="1" fontAlgn="base" latinLnBrk="0" hangingPunct="1">
+              <a:lnSpc>
+                <a:spcPct val="100000"/>
+              </a:lnSpc>
+              <a:spcBef>
+                <a:spcPts val="1000"/>
+              </a:spcBef>
+              <a:spcAft>
+                <a:spcPct val="0"/>
+              </a:spcAft>
+              <a:buClr>
+                <a:srgbClr val="CC0000"/>
+              </a:buClr>
+              <a:buSzPct val="100000"/>
+              <a:buFont typeface="Arial"/>
+              <a:buNone/>
+              <a:tabLst/>
+              <a:defRPr/>
+            </a:pPr>
+            <a:r>
+              <a:rPr kumimoji="0" lang="en-US" sz="3600" b="0" i="0" u="none" strike="noStrike" kern="1200" cap="none" spc="0" normalizeH="0" baseline="0" noProof="0" dirty="0" err="1">
+                <a:ln>
+                  <a:noFill/>
+                </a:ln>
+                <a:solidFill>
+                  <a:srgbClr val="F2F2F2"/>
+                </a:solidFill>
+                <a:effectLst/>
+                <a:uLnTx/>
+                <a:uFillTx/>
+                <a:latin typeface="IBM Plex Sans" panose="020B0503050203000203" pitchFamily="34" charset="77"/>
+                <a:ea typeface="+mn-ea"/>
+              </a:rPr>
+              <a:t>Incomm</a:t>
+            </a:r>
+            <a:r>
+              <a:rPr kumimoji="0" lang="en-US" sz="3600" b="0" i="0" u="none" strike="noStrike" kern="1200" cap="none" spc="0" normalizeH="0" baseline="0" noProof="0" dirty="0">
+                <a:ln>
+                  <a:noFill/>
+                </a:ln>
+                <a:solidFill>
+                  <a:srgbClr val="F2F2F2"/>
+                </a:solidFill>
+                <a:effectLst/>
+                <a:uLnTx/>
+                <a:uFillTx/>
+                <a:latin typeface="IBM Plex Sans" panose="020B0503050203000203" pitchFamily="34" charset="77"/>
+                <a:ea typeface="+mn-ea"/>
+              </a:rPr>
+              <a:t> Payments</a:t>
+            </a:r>
           </a:p>
         </p:txBody>
       </p:sp>
     </p:spTree>
     <p:extLst>
       <p:ext uri="{BB962C8B-B14F-4D97-AF65-F5344CB8AC3E}">
-        <p14:creationId xmlns:p14="http://schemas.microsoft.com/office/powerpoint/2010/main" val="3443376465"/>
+        <p14:creationId xmlns:p14="http://schemas.microsoft.com/office/powerpoint/2010/main" val="2852513115"/>
       </p:ext>
     </p:extLst>
   </p:cSld>
   <p:clrMapOvr>
     <a:masterClrMapping/>
-  </p:clrMapOvr>
-</p:sld>
-</file>
-
-<file path=ppt/slides/slide3.xml><?xml version="1.0" encoding="utf-8"?>
-<p:sld xmlns:a="http://schemas.openxmlformats.org/drawingml/2006/main" xmlns:r="http://schemas.openxmlformats.org/officeDocument/2006/relationships" xmlns:p="http://schemas.openxmlformats.org/presentationml/2006/main">
-  <p:cSld>
-    <p:bg>
-      <p:bgPr>
-        <a:gradFill rotWithShape="1">
-          <a:gsLst>
-            <a:gs pos="0">
-              <a:schemeClr val="bg1">
-                <a:tint val="94000"/>
-                <a:satMod val="80000"/>
-                <a:lumMod val="106000"/>
-              </a:schemeClr>
-            </a:gs>
-            <a:gs pos="100000">
-              <a:schemeClr val="bg1">
-                <a:shade val="80000"/>
-              </a:schemeClr>
-            </a:gs>
-          </a:gsLst>
-          <a:path path="circle">
-            <a:fillToRect l="43000" r="43000" b="100000"/>
-          </a:path>
-        </a:gradFill>
-        <a:effectLst/>
-      </p:bgPr>
-    </p:bg>
-    <p:spTree>
-      <p:nvGrpSpPr>
-        <p:cNvPr id="1" name=""/>
-        <p:cNvGrpSpPr/>
-        <p:nvPr/>
-      </p:nvGrpSpPr>
-      <p:grpSpPr>
-        <a:xfrm>
-          <a:off x="0" y="0"/>
-          <a:ext cx="0" cy="0"/>
-          <a:chOff x="0" y="0"/>
-          <a:chExt cx="0" cy="0"/>
-        </a:xfrm>
-      </p:grpSpPr>
-      <p:sp>
-        <p:nvSpPr>
-          <p:cNvPr id="2" name="Title 1">
-            <a:extLst>
-              <a:ext uri="{FF2B5EF4-FFF2-40B4-BE49-F238E27FC236}">
-                <a16:creationId xmlns:a16="http://schemas.microsoft.com/office/drawing/2014/main" id="{59972A48-B823-41F2-AF1F-00AF935A7339}"/>
-              </a:ext>
-            </a:extLst>
-          </p:cNvPr>
-          <p:cNvSpPr>
-            <a:spLocks noGrp="1"/>
-          </p:cNvSpPr>
-          <p:nvPr>
-            <p:ph type="title"/>
-          </p:nvPr>
-        </p:nvSpPr>
-        <p:spPr/>
-        <p:txBody>
-          <a:bodyPr>
-            <a:normAutofit/>
-          </a:bodyPr>
-          <a:lstStyle/>
-          <a:p>
-            <a:r>
-              <a:rPr lang="en-US" dirty="0"/>
-              <a:t>Batching Major operations </a:t>
-            </a:r>
-          </a:p>
-        </p:txBody>
-      </p:sp>
-      <p:sp>
-        <p:nvSpPr>
-          <p:cNvPr id="3" name="Content Placeholder 2">
-            <a:extLst>
-              <a:ext uri="{FF2B5EF4-FFF2-40B4-BE49-F238E27FC236}">
-                <a16:creationId xmlns:a16="http://schemas.microsoft.com/office/drawing/2014/main" id="{B5578237-7D17-4080-969D-3D392F7C91B1}"/>
-              </a:ext>
-            </a:extLst>
-          </p:cNvPr>
-          <p:cNvSpPr>
-            <a:spLocks noGrp="1"/>
-          </p:cNvSpPr>
-          <p:nvPr>
-            <p:ph idx="1"/>
-          </p:nvPr>
-        </p:nvSpPr>
-        <p:spPr/>
-        <p:txBody>
-          <a:bodyPr>
-            <a:normAutofit fontScale="92500" lnSpcReduction="20000"/>
-          </a:bodyPr>
-          <a:lstStyle/>
-          <a:p>
-            <a:r>
-              <a:rPr lang="en-US" dirty="0"/>
-              <a:t>The purpose is to allow larger operations to occur as needed with no interruption of service or significant blocking.</a:t>
-            </a:r>
-          </a:p>
-          <a:p>
-            <a:r>
-              <a:rPr lang="en-US" dirty="0"/>
-              <a:t>Garbage collection</a:t>
-            </a:r>
-          </a:p>
-          <a:p>
-            <a:r>
-              <a:rPr lang="en-US" dirty="0"/>
-              <a:t>Data archival</a:t>
-            </a:r>
-          </a:p>
-          <a:p>
-            <a:r>
-              <a:rPr lang="en-US" dirty="0"/>
-              <a:t>Backfilling new columns</a:t>
-            </a:r>
-          </a:p>
-          <a:p>
-            <a:r>
-              <a:rPr lang="en-US" dirty="0"/>
-              <a:t>Managing PII (GDPR\CCPA)</a:t>
-            </a:r>
-          </a:p>
-          <a:p>
-            <a:pPr lvl="1"/>
-            <a:r>
-              <a:rPr lang="en-US" dirty="0"/>
-              <a:t>Anonymization\obfuscation</a:t>
-            </a:r>
-          </a:p>
-          <a:p>
-            <a:pPr lvl="1"/>
-            <a:r>
-              <a:rPr lang="en-US" dirty="0"/>
-              <a:t>Masking\encryption</a:t>
-            </a:r>
-          </a:p>
-          <a:p>
-            <a:r>
-              <a:rPr lang="en-US" dirty="0"/>
-              <a:t>Batching large queries\reports against OLTP</a:t>
-            </a:r>
-          </a:p>
-        </p:txBody>
-      </p:sp>
-    </p:spTree>
-    <p:extLst>
-      <p:ext uri="{BB962C8B-B14F-4D97-AF65-F5344CB8AC3E}">
-        <p14:creationId xmlns:p14="http://schemas.microsoft.com/office/powerpoint/2010/main" val="3291585241"/>
-      </p:ext>
-    </p:extLst>
-  </p:cSld>
-  <p:clrMapOvr>
-    <a:overrideClrMapping bg1="dk1" tx1="lt1" bg2="dk2" tx2="lt2" accent1="accent1" accent2="accent2" accent3="accent3" accent4="accent4" accent5="accent5" accent6="accent6" hlink="hlink" folHlink="folHlink"/>
   </p:clrMapOvr>
 </p:sld>
 </file>
@@ -5737,7 +8388,7 @@
           <p:cNvPr id="2" name="Title 1">
             <a:extLst>
               <a:ext uri="{FF2B5EF4-FFF2-40B4-BE49-F238E27FC236}">
-                <a16:creationId xmlns:a16="http://schemas.microsoft.com/office/drawing/2014/main" id="{00381E32-EA04-49D8-B7EC-660B04D068ED}"/>
+                <a16:creationId xmlns:a16="http://schemas.microsoft.com/office/drawing/2014/main" id="{59972A48-B823-41F2-AF1F-00AF935A7339}"/>
               </a:ext>
             </a:extLst>
           </p:cNvPr>
@@ -5756,10 +8407,9 @@
           <a:lstStyle/>
           <a:p>
             <a:r>
-              <a:rPr lang="en-US"/>
-              <a:t>Foundation</a:t>
-            </a:r>
-            <a:endParaRPr lang="en-US" dirty="0"/>
+              <a:rPr lang="en-US" dirty="0"/>
+              <a:t>Batching Major operations </a:t>
+            </a:r>
           </a:p>
         </p:txBody>
       </p:sp>
@@ -5768,7 +8418,7 @@
           <p:cNvPr id="3" name="Content Placeholder 2">
             <a:extLst>
               <a:ext uri="{FF2B5EF4-FFF2-40B4-BE49-F238E27FC236}">
-                <a16:creationId xmlns:a16="http://schemas.microsoft.com/office/drawing/2014/main" id="{1C5D8DF6-F5CC-458C-99C6-D9A6113230B7}"/>
+                <a16:creationId xmlns:a16="http://schemas.microsoft.com/office/drawing/2014/main" id="{B5578237-7D17-4080-969D-3D392F7C91B1}"/>
               </a:ext>
             </a:extLst>
           </p:cNvPr>
@@ -5782,84 +8432,65 @@
         <p:spPr/>
         <p:txBody>
           <a:bodyPr>
-            <a:normAutofit/>
+            <a:normAutofit fontScale="92500" lnSpcReduction="20000"/>
           </a:bodyPr>
           <a:lstStyle/>
           <a:p>
             <a:r>
               <a:rPr lang="en-US" dirty="0"/>
-              <a:t>What should an efficient TOP plan look like?</a:t>
+              <a:t>The purpose is to allow larger operations to occur as needed with no interruption of service or significant blocking.</a:t>
             </a:r>
           </a:p>
           <a:p>
             <a:r>
               <a:rPr lang="en-US" dirty="0"/>
-              <a:t>Understanding the flow of row mode execution</a:t>
+              <a:t>Garbage collection</a:t>
             </a:r>
           </a:p>
           <a:p>
             <a:r>
               <a:rPr lang="en-US" dirty="0"/>
-              <a:t>Common caveats</a:t>
+              <a:t>Data archival</a:t>
+            </a:r>
+          </a:p>
+          <a:p>
+            <a:r>
+              <a:rPr lang="en-US" dirty="0"/>
+              <a:t>Backfilling new columns</a:t>
+            </a:r>
+          </a:p>
+          <a:p>
+            <a:r>
+              <a:rPr lang="en-US" dirty="0"/>
+              <a:t>Managing PII (GDPR\CCPA)</a:t>
             </a:r>
           </a:p>
           <a:p>
             <a:pPr lvl="1"/>
             <a:r>
               <a:rPr lang="en-US" dirty="0"/>
-              <a:t>Blocking operators</a:t>
+              <a:t>Anonymization\obfuscation</a:t>
             </a:r>
           </a:p>
           <a:p>
             <a:pPr lvl="1"/>
             <a:r>
               <a:rPr lang="en-US" dirty="0"/>
-              <a:t>Sorts</a:t>
-            </a:r>
-          </a:p>
-          <a:p>
-            <a:pPr lvl="1"/>
+              <a:t>Masking\encryption</a:t>
+            </a:r>
+          </a:p>
+          <a:p>
             <a:r>
               <a:rPr lang="en-US" dirty="0"/>
-              <a:t>Conflicting criteria (alignment)</a:t>
-            </a:r>
-          </a:p>
-        </p:txBody>
-      </p:sp>
-      <p:pic>
-        <p:nvPicPr>
-          <p:cNvPr id="5" name="Picture 4" descr="Diagram&#10;&#10;Description automatically generated">
-            <a:extLst>
-              <a:ext uri="{FF2B5EF4-FFF2-40B4-BE49-F238E27FC236}">
-                <a16:creationId xmlns:a16="http://schemas.microsoft.com/office/drawing/2014/main" id="{B46CDA63-3852-4A8D-917C-69BF91C5F2F7}"/>
-              </a:ext>
-            </a:extLst>
-          </p:cNvPr>
-          <p:cNvPicPr>
-            <a:picLocks noChangeAspect="1"/>
-          </p:cNvPicPr>
-          <p:nvPr/>
-        </p:nvPicPr>
-        <p:blipFill>
-          <a:blip r:embed="rId3"/>
-          <a:stretch>
-            <a:fillRect/>
-          </a:stretch>
-        </p:blipFill>
-        <p:spPr>
-          <a:xfrm>
-            <a:off x="6288648" y="3401451"/>
-            <a:ext cx="4451773" cy="2064894"/>
-          </a:xfrm>
-          <a:prstGeom prst="rect">
-            <a:avLst/>
-          </a:prstGeom>
-        </p:spPr>
-      </p:pic>
+              <a:t>Batching large queries\reports against OLTP</a:t>
+            </a:r>
+          </a:p>
+        </p:txBody>
+      </p:sp>
     </p:spTree>
     <p:extLst>
       <p:ext uri="{BB962C8B-B14F-4D97-AF65-F5344CB8AC3E}">
-        <p14:creationId xmlns:p14="http://schemas.microsoft.com/office/powerpoint/2010/main" val="480440924"/>
+        <p14:creationId xmlns:p14="http://schemas.microsoft.com/office/powerpoint/2010/main" val="3291585241"/>
       </p:ext>
     </p:extLst>
   </p:cSld>
@@ -5915,7 +8546,7 @@
           <p:cNvPr id="2" name="Title 1">
             <a:extLst>
               <a:ext uri="{FF2B5EF4-FFF2-40B4-BE49-F238E27FC236}">
-                <a16:creationId xmlns:a16="http://schemas.microsoft.com/office/drawing/2014/main" id="{897594E2-D046-4609-B803-88C4C9352505}"/>
+                <a16:creationId xmlns:a16="http://schemas.microsoft.com/office/drawing/2014/main" id="{00381E32-EA04-49D8-B7EC-660B04D068ED}"/>
               </a:ext>
             </a:extLst>
           </p:cNvPr>
@@ -5926,31 +8557,27 @@
             <p:ph type="title"/>
           </p:nvPr>
         </p:nvSpPr>
-        <p:spPr>
-          <a:xfrm>
-            <a:off x="893523" y="804519"/>
-            <a:ext cx="3160501" cy="4431360"/>
-          </a:xfrm>
-        </p:spPr>
-        <p:txBody>
-          <a:bodyPr anchor="ctr">
+        <p:spPr/>
+        <p:txBody>
+          <a:bodyPr>
             <a:normAutofit/>
           </a:bodyPr>
           <a:lstStyle/>
           <a:p>
             <a:r>
-              <a:rPr lang="en-US" dirty="0"/>
-              <a:t>What are blocking operators?</a:t>
-            </a:r>
-          </a:p>
-        </p:txBody>
-      </p:sp>
-      <p:sp>
-        <p:nvSpPr>
-          <p:cNvPr id="43" name="Content Placeholder 2">
+              <a:rPr lang="en-US"/>
+              <a:t>Foundation</a:t>
+            </a:r>
+            <a:endParaRPr lang="en-US" dirty="0"/>
+          </a:p>
+        </p:txBody>
+      </p:sp>
+      <p:sp>
+        <p:nvSpPr>
+          <p:cNvPr id="3" name="Content Placeholder 2">
             <a:extLst>
               <a:ext uri="{FF2B5EF4-FFF2-40B4-BE49-F238E27FC236}">
-                <a16:creationId xmlns:a16="http://schemas.microsoft.com/office/drawing/2014/main" id="{960A150C-B631-4460-B788-0A37E7185A1C}"/>
+                <a16:creationId xmlns:a16="http://schemas.microsoft.com/office/drawing/2014/main" id="{1C5D8DF6-F5CC-458C-99C6-D9A6113230B7}"/>
               </a:ext>
             </a:extLst>
           </p:cNvPr>
@@ -5961,87 +8588,87 @@
             <p:ph idx="1"/>
           </p:nvPr>
         </p:nvSpPr>
-        <p:spPr>
-          <a:xfrm>
-            <a:off x="4637863" y="804520"/>
-            <a:ext cx="6102559" cy="4431359"/>
-          </a:xfrm>
-        </p:spPr>
-        <p:txBody>
-          <a:bodyPr anchor="ctr">
+        <p:spPr/>
+        <p:txBody>
+          <a:bodyPr>
             <a:normAutofit/>
           </a:bodyPr>
           <a:lstStyle/>
           <a:p>
             <a:r>
               <a:rPr lang="en-US" dirty="0"/>
-              <a:t>Blog post: </a:t>
-            </a:r>
-            <a:r>
-              <a:rPr lang="en-US" dirty="0">
-                <a:hlinkClick r:id="rId2"/>
-              </a:rPr>
-              <a:t>Getting to the Bottom of Top</a:t>
-            </a:r>
-            <a:endParaRPr lang="en-US" dirty="0"/>
+              <a:t>What should an efficient TOP plan look like?</a:t>
+            </a:r>
           </a:p>
           <a:p>
             <a:r>
               <a:rPr lang="en-US" dirty="0"/>
-              <a:t>Examples of </a:t>
-            </a:r>
-            <a:r>
-              <a:rPr lang="en-US" dirty="0">
-                <a:hlinkClick r:id="rId3"/>
-              </a:rPr>
-              <a:t>blocking operators</a:t>
-            </a:r>
+              <a:t>Understanding the flow of row mode execution</a:t>
+            </a:r>
+          </a:p>
+          <a:p>
             <a:r>
               <a:rPr lang="en-US" dirty="0"/>
-              <a:t>:</a:t>
+              <a:t>Common caveats</a:t>
             </a:r>
           </a:p>
           <a:p>
             <a:pPr lvl="1"/>
             <a:r>
               <a:rPr lang="en-US" dirty="0"/>
-              <a:t>SORT</a:t>
+              <a:t>Blocking operators</a:t>
             </a:r>
           </a:p>
           <a:p>
             <a:pPr lvl="1"/>
             <a:r>
               <a:rPr lang="en-US" dirty="0"/>
-              <a:t>HASH MATCH (build input only)</a:t>
+              <a:t>Sorts</a:t>
             </a:r>
           </a:p>
           <a:p>
             <a:pPr lvl="1"/>
             <a:r>
               <a:rPr lang="en-US" dirty="0"/>
-              <a:t>Eager spool</a:t>
-            </a:r>
-          </a:p>
-          <a:p>
-            <a:pPr lvl="1"/>
-            <a:r>
-              <a:rPr lang="en-US" dirty="0"/>
-              <a:t>Remote range\scan\query\fetch\modify</a:t>
-            </a:r>
-          </a:p>
-          <a:p>
-            <a:pPr lvl="1"/>
-            <a:r>
-              <a:rPr lang="en-US" dirty="0"/>
-              <a:t>Scalar aggregate (no group by)</a:t>
-            </a:r>
-          </a:p>
-        </p:txBody>
-      </p:sp>
+              <a:t>Conflicting criteria (alignment)</a:t>
+            </a:r>
+          </a:p>
+        </p:txBody>
+      </p:sp>
+      <p:pic>
+        <p:nvPicPr>
+          <p:cNvPr id="5" name="Picture 4" descr="Diagram&#10;&#10;Description automatically generated">
+            <a:extLst>
+              <a:ext uri="{FF2B5EF4-FFF2-40B4-BE49-F238E27FC236}">
+                <a16:creationId xmlns:a16="http://schemas.microsoft.com/office/drawing/2014/main" id="{B46CDA63-3852-4A8D-917C-69BF91C5F2F7}"/>
+              </a:ext>
+            </a:extLst>
+          </p:cNvPr>
+          <p:cNvPicPr>
+            <a:picLocks noChangeAspect="1"/>
+          </p:cNvPicPr>
+          <p:nvPr/>
+        </p:nvPicPr>
+        <p:blipFill>
+          <a:blip r:embed="rId3"/>
+          <a:stretch>
+            <a:fillRect/>
+          </a:stretch>
+        </p:blipFill>
+        <p:spPr>
+          <a:xfrm>
+            <a:off x="6288648" y="3407982"/>
+            <a:ext cx="4451773" cy="2064894"/>
+          </a:xfrm>
+          <a:prstGeom prst="rect">
+            <a:avLst/>
+          </a:prstGeom>
+        </p:spPr>
+      </p:pic>
     </p:spTree>
     <p:extLst>
       <p:ext uri="{BB962C8B-B14F-4D97-AF65-F5344CB8AC3E}">
-        <p14:creationId xmlns:p14="http://schemas.microsoft.com/office/powerpoint/2010/main" val="789172884"/>
+        <p14:creationId xmlns:p14="http://schemas.microsoft.com/office/powerpoint/2010/main" val="480440924"/>
       </p:ext>
     </p:extLst>
   </p:cSld>

</xml_diff>